<commit_message>
feat(ppt): change font to Roboto
</commit_message>
<xml_diff>
--- a/powerpoint/Consumer-Driven Contract Tests using PACT.pptx
+++ b/powerpoint/Consumer-Driven Contract Tests using PACT.pptx
@@ -4114,12 +4114,12 @@
         </a:fontRef>
       </dsp:style>
       <dsp:txBody>
-        <a:bodyPr spcFirstLastPara="0" vert="horz" wrap="square" lIns="20320" tIns="20320" rIns="20320" bIns="20320" numCol="1" spcCol="1270" anchor="ctr" anchorCtr="0">
+        <a:bodyPr spcFirstLastPara="0" vert="horz" wrap="square" lIns="21590" tIns="21590" rIns="21590" bIns="21590" numCol="1" spcCol="1270" anchor="ctr" anchorCtr="0">
           <a:noAutofit/>
         </a:bodyPr>
         <a:lstStyle/>
         <a:p>
-          <a:pPr marL="0" lvl="0" indent="0" algn="ctr" defTabSz="711200">
+          <a:pPr marL="0" lvl="0" indent="0" algn="ctr" defTabSz="755650">
             <a:lnSpc>
               <a:spcPct val="90000"/>
             </a:lnSpc>
@@ -4132,14 +4132,14 @@
             <a:buNone/>
           </a:pPr>
           <a:br>
-            <a:rPr lang="de-DE" sz="1600" kern="1200" dirty="0">
+            <a:rPr lang="de-DE" sz="1700" kern="1200" dirty="0">
               <a:solidFill>
                 <a:schemeClr val="bg1"/>
               </a:solidFill>
             </a:rPr>
           </a:br>
           <a:r>
-            <a:rPr lang="de-DE" sz="1600" kern="1200" dirty="0">
+            <a:rPr lang="de-DE" sz="1700" kern="1200" dirty="0">
               <a:solidFill>
                 <a:schemeClr val="bg1"/>
               </a:solidFill>
@@ -4147,14 +4147,14 @@
             <a:t>UI </a:t>
           </a:r>
           <a:br>
-            <a:rPr lang="de-DE" sz="1600" kern="1200" dirty="0">
+            <a:rPr lang="de-DE" sz="1700" kern="1200" dirty="0">
               <a:solidFill>
                 <a:schemeClr val="bg1"/>
               </a:solidFill>
             </a:rPr>
           </a:br>
           <a:r>
-            <a:rPr lang="de-DE" sz="1600" kern="1200" dirty="0">
+            <a:rPr lang="de-DE" sz="1700" kern="1200" dirty="0">
               <a:solidFill>
                 <a:schemeClr val="bg1"/>
               </a:solidFill>
@@ -4226,12 +4226,12 @@
         </a:fontRef>
       </dsp:style>
       <dsp:txBody>
-        <a:bodyPr spcFirstLastPara="0" vert="horz" wrap="square" lIns="20320" tIns="20320" rIns="20320" bIns="20320" numCol="1" spcCol="1270" anchor="ctr" anchorCtr="0">
+        <a:bodyPr spcFirstLastPara="0" vert="horz" wrap="square" lIns="21590" tIns="21590" rIns="21590" bIns="21590" numCol="1" spcCol="1270" anchor="ctr" anchorCtr="0">
           <a:noAutofit/>
         </a:bodyPr>
         <a:lstStyle/>
         <a:p>
-          <a:pPr marL="0" lvl="0" indent="0" algn="ctr" defTabSz="711200">
+          <a:pPr marL="0" lvl="0" indent="0" algn="ctr" defTabSz="755650">
             <a:lnSpc>
               <a:spcPct val="90000"/>
             </a:lnSpc>
@@ -4244,7 +4244,7 @@
             <a:buNone/>
           </a:pPr>
           <a:r>
-            <a:rPr lang="de-DE" sz="1600" kern="1200" dirty="0">
+            <a:rPr lang="de-DE" sz="1700" kern="1200" dirty="0">
               <a:solidFill>
                 <a:schemeClr val="bg1"/>
               </a:solidFill>
@@ -4316,12 +4316,12 @@
         </a:fontRef>
       </dsp:style>
       <dsp:txBody>
-        <a:bodyPr spcFirstLastPara="0" vert="horz" wrap="square" lIns="20320" tIns="20320" rIns="20320" bIns="20320" numCol="1" spcCol="1270" anchor="ctr" anchorCtr="0">
+        <a:bodyPr spcFirstLastPara="0" vert="horz" wrap="square" lIns="21590" tIns="21590" rIns="21590" bIns="21590" numCol="1" spcCol="1270" anchor="ctr" anchorCtr="0">
           <a:noAutofit/>
         </a:bodyPr>
         <a:lstStyle/>
         <a:p>
-          <a:pPr marL="0" lvl="0" indent="0" algn="ctr" defTabSz="711200">
+          <a:pPr marL="0" lvl="0" indent="0" algn="ctr" defTabSz="755650">
             <a:lnSpc>
               <a:spcPct val="90000"/>
             </a:lnSpc>
@@ -4334,7 +4334,7 @@
             <a:buNone/>
           </a:pPr>
           <a:r>
-            <a:rPr lang="de-DE" sz="1600" kern="1200" dirty="0">
+            <a:rPr lang="de-DE" sz="1700" kern="1200" dirty="0">
               <a:solidFill>
                 <a:schemeClr val="bg1"/>
               </a:solidFill>
@@ -4406,12 +4406,12 @@
         </a:fontRef>
       </dsp:style>
       <dsp:txBody>
-        <a:bodyPr spcFirstLastPara="0" vert="horz" wrap="square" lIns="20320" tIns="20320" rIns="20320" bIns="20320" numCol="1" spcCol="1270" anchor="ctr" anchorCtr="0">
+        <a:bodyPr spcFirstLastPara="0" vert="horz" wrap="square" lIns="21590" tIns="21590" rIns="21590" bIns="21590" numCol="1" spcCol="1270" anchor="ctr" anchorCtr="0">
           <a:noAutofit/>
         </a:bodyPr>
         <a:lstStyle/>
         <a:p>
-          <a:pPr marL="0" lvl="0" indent="0" algn="ctr" defTabSz="711200">
+          <a:pPr marL="0" lvl="0" indent="0" algn="ctr" defTabSz="755650">
             <a:lnSpc>
               <a:spcPct val="90000"/>
             </a:lnSpc>
@@ -4424,7 +4424,7 @@
             <a:buNone/>
           </a:pPr>
           <a:r>
-            <a:rPr lang="de-DE" sz="1600" kern="1200" dirty="0" err="1">
+            <a:rPr lang="de-DE" sz="1700" kern="1200" dirty="0" err="1">
               <a:solidFill>
                 <a:schemeClr val="bg1"/>
               </a:solidFill>
@@ -4432,7 +4432,7 @@
             <a:t>Component</a:t>
           </a:r>
           <a:r>
-            <a:rPr lang="de-DE" sz="1600" kern="1200" dirty="0">
+            <a:rPr lang="de-DE" sz="1700" kern="1200" dirty="0">
               <a:solidFill>
                 <a:schemeClr val="bg1"/>
               </a:solidFill>
@@ -4504,12 +4504,12 @@
         </a:fontRef>
       </dsp:style>
       <dsp:txBody>
-        <a:bodyPr spcFirstLastPara="0" vert="horz" wrap="square" lIns="20320" tIns="20320" rIns="20320" bIns="20320" numCol="1" spcCol="1270" anchor="ctr" anchorCtr="0">
+        <a:bodyPr spcFirstLastPara="0" vert="horz" wrap="square" lIns="21590" tIns="21590" rIns="21590" bIns="21590" numCol="1" spcCol="1270" anchor="ctr" anchorCtr="0">
           <a:noAutofit/>
         </a:bodyPr>
         <a:lstStyle/>
         <a:p>
-          <a:pPr marL="0" lvl="0" indent="0" algn="ctr" defTabSz="711200">
+          <a:pPr marL="0" lvl="0" indent="0" algn="ctr" defTabSz="755650">
             <a:lnSpc>
               <a:spcPct val="90000"/>
             </a:lnSpc>
@@ -4522,7 +4522,7 @@
             <a:buNone/>
           </a:pPr>
           <a:r>
-            <a:rPr lang="de-DE" sz="1600" kern="1200" dirty="0">
+            <a:rPr lang="de-DE" sz="1700" kern="1200" dirty="0">
               <a:solidFill>
                 <a:schemeClr val="bg1"/>
               </a:solidFill>
@@ -4836,12 +4836,12 @@
         </a:fontRef>
       </dsp:style>
       <dsp:txBody>
-        <a:bodyPr spcFirstLastPara="0" vert="horz" wrap="square" lIns="24130" tIns="24130" rIns="24130" bIns="24130" numCol="1" spcCol="1270" anchor="ctr" anchorCtr="0">
+        <a:bodyPr spcFirstLastPara="0" vert="horz" wrap="square" lIns="22225" tIns="22225" rIns="22225" bIns="22225" numCol="1" spcCol="1270" anchor="ctr" anchorCtr="0">
           <a:noAutofit/>
         </a:bodyPr>
         <a:lstStyle/>
         <a:p>
-          <a:pPr marL="0" lvl="0" indent="0" algn="ctr" defTabSz="1689100">
+          <a:pPr marL="0" lvl="0" indent="0" algn="ctr" defTabSz="1555750">
             <a:lnSpc>
               <a:spcPct val="90000"/>
             </a:lnSpc>
@@ -4854,7 +4854,7 @@
             <a:buNone/>
           </a:pPr>
           <a:r>
-            <a:rPr lang="de-DE" sz="3800" kern="1200" dirty="0"/>
+            <a:rPr lang="de-DE" sz="3500" kern="1200" dirty="0"/>
             <a:t>Consumer</a:t>
           </a:r>
         </a:p>
@@ -4914,12 +4914,12 @@
         </a:fontRef>
       </dsp:style>
       <dsp:txBody>
-        <a:bodyPr spcFirstLastPara="0" vert="horz" wrap="square" lIns="24130" tIns="24130" rIns="24130" bIns="24130" numCol="1" spcCol="1270" anchor="ctr" anchorCtr="0">
+        <a:bodyPr spcFirstLastPara="0" vert="horz" wrap="square" lIns="22225" tIns="22225" rIns="22225" bIns="22225" numCol="1" spcCol="1270" anchor="ctr" anchorCtr="0">
           <a:noAutofit/>
         </a:bodyPr>
         <a:lstStyle/>
         <a:p>
-          <a:pPr marL="0" lvl="0" indent="0" algn="ctr" defTabSz="1689100">
+          <a:pPr marL="0" lvl="0" indent="0" algn="ctr" defTabSz="1555750">
             <a:lnSpc>
               <a:spcPct val="90000"/>
             </a:lnSpc>
@@ -4932,7 +4932,7 @@
             <a:buNone/>
           </a:pPr>
           <a:r>
-            <a:rPr lang="de-DE" sz="3800" kern="1200" dirty="0"/>
+            <a:rPr lang="de-DE" sz="3500" kern="1200" dirty="0"/>
             <a:t>Service 1</a:t>
           </a:r>
         </a:p>
@@ -4992,12 +4992,12 @@
         </a:fontRef>
       </dsp:style>
       <dsp:txBody>
-        <a:bodyPr spcFirstLastPara="0" vert="horz" wrap="square" lIns="24130" tIns="24130" rIns="24130" bIns="24130" numCol="1" spcCol="1270" anchor="ctr" anchorCtr="0">
+        <a:bodyPr spcFirstLastPara="0" vert="horz" wrap="square" lIns="22225" tIns="22225" rIns="22225" bIns="22225" numCol="1" spcCol="1270" anchor="ctr" anchorCtr="0">
           <a:noAutofit/>
         </a:bodyPr>
         <a:lstStyle/>
         <a:p>
-          <a:pPr marL="0" lvl="0" indent="0" algn="ctr" defTabSz="1689100">
+          <a:pPr marL="0" lvl="0" indent="0" algn="ctr" defTabSz="1555750">
             <a:lnSpc>
               <a:spcPct val="90000"/>
             </a:lnSpc>
@@ -5010,7 +5010,7 @@
             <a:buNone/>
           </a:pPr>
           <a:r>
-            <a:rPr lang="de-DE" sz="3800" kern="1200" dirty="0"/>
+            <a:rPr lang="de-DE" sz="3500" kern="1200" dirty="0"/>
             <a:t>Data 1</a:t>
           </a:r>
         </a:p>
@@ -5070,12 +5070,12 @@
         </a:fontRef>
       </dsp:style>
       <dsp:txBody>
-        <a:bodyPr spcFirstLastPara="0" vert="horz" wrap="square" lIns="24130" tIns="24130" rIns="24130" bIns="24130" numCol="1" spcCol="1270" anchor="ctr" anchorCtr="0">
+        <a:bodyPr spcFirstLastPara="0" vert="horz" wrap="square" lIns="22225" tIns="22225" rIns="22225" bIns="22225" numCol="1" spcCol="1270" anchor="ctr" anchorCtr="0">
           <a:noAutofit/>
         </a:bodyPr>
         <a:lstStyle/>
         <a:p>
-          <a:pPr marL="0" lvl="0" indent="0" algn="ctr" defTabSz="1689100">
+          <a:pPr marL="0" lvl="0" indent="0" algn="ctr" defTabSz="1555750">
             <a:lnSpc>
               <a:spcPct val="90000"/>
             </a:lnSpc>
@@ -5088,7 +5088,7 @@
             <a:buNone/>
           </a:pPr>
           <a:r>
-            <a:rPr lang="de-DE" sz="3800" kern="1200" dirty="0"/>
+            <a:rPr lang="de-DE" sz="3500" kern="1200" dirty="0"/>
             <a:t>Service 2</a:t>
           </a:r>
         </a:p>
@@ -5148,12 +5148,12 @@
         </a:fontRef>
       </dsp:style>
       <dsp:txBody>
-        <a:bodyPr spcFirstLastPara="0" vert="horz" wrap="square" lIns="24130" tIns="24130" rIns="24130" bIns="24130" numCol="1" spcCol="1270" anchor="ctr" anchorCtr="0">
+        <a:bodyPr spcFirstLastPara="0" vert="horz" wrap="square" lIns="22225" tIns="22225" rIns="22225" bIns="22225" numCol="1" spcCol="1270" anchor="ctr" anchorCtr="0">
           <a:noAutofit/>
         </a:bodyPr>
         <a:lstStyle/>
         <a:p>
-          <a:pPr marL="0" lvl="0" indent="0" algn="ctr" defTabSz="1689100">
+          <a:pPr marL="0" lvl="0" indent="0" algn="ctr" defTabSz="1555750">
             <a:lnSpc>
               <a:spcPct val="90000"/>
             </a:lnSpc>
@@ -5166,7 +5166,7 @@
             <a:buNone/>
           </a:pPr>
           <a:r>
-            <a:rPr lang="de-DE" sz="3800" kern="1200" dirty="0"/>
+            <a:rPr lang="de-DE" sz="3500" kern="1200" dirty="0"/>
             <a:t>Data 2</a:t>
           </a:r>
         </a:p>
@@ -11490,12 +11490,15 @@
           <a:bodyPr anchor="b"/>
           <a:lstStyle>
             <a:lvl1pPr algn="ctr">
-              <a:defRPr sz="6000"/>
+              <a:defRPr sz="6000">
+                <a:latin typeface="+mj-lt"/>
+                <a:ea typeface="Roboto" panose="02000000000000000000" pitchFamily="2" charset="0"/>
+              </a:defRPr>
             </a:lvl1pPr>
           </a:lstStyle>
           <a:p>
             <a:r>
-              <a:rPr lang="de-DE"/>
+              <a:rPr lang="de-DE" dirty="0"/>
               <a:t>Mastertitelformat bearbeiten</a:t>
             </a:r>
           </a:p>
@@ -11528,7 +11531,10 @@
           <a:lstStyle>
             <a:lvl1pPr marL="0" indent="0" algn="ctr">
               <a:buNone/>
-              <a:defRPr sz="2400"/>
+              <a:defRPr sz="2400">
+                <a:latin typeface="+mn-lt"/>
+                <a:ea typeface="Roboto" panose="02000000000000000000" pitchFamily="2" charset="0"/>
+              </a:defRPr>
             </a:lvl1pPr>
             <a:lvl2pPr marL="457200" indent="0" algn="ctr">
               <a:buNone/>
@@ -11565,7 +11571,7 @@
           </a:lstStyle>
           <a:p>
             <a:r>
-              <a:rPr lang="de-DE"/>
+              <a:rPr lang="de-DE" dirty="0"/>
               <a:t>Master-Untertitelformat bearbeiten</a:t>
             </a:r>
           </a:p>
@@ -11590,13 +11596,21 @@
         <p:spPr/>
         <p:txBody>
           <a:bodyPr/>
-          <a:lstStyle/>
+          <a:lstStyle>
+            <a:lvl1pPr>
+              <a:defRPr>
+                <a:latin typeface="+mn-lt"/>
+                <a:ea typeface="Roboto" panose="02000000000000000000" pitchFamily="2" charset="0"/>
+              </a:defRPr>
+            </a:lvl1pPr>
+          </a:lstStyle>
           <a:p>
             <a:fld id="{4DCA6C4A-C3BE-4614-8178-1E634F454DE2}" type="datetimeFigureOut">
               <a:rPr lang="de-DE" smtClean="0"/>
-              <a:t>27.04.2019</a:t>
+              <a:pPr/>
+              <a:t>15.05.2019</a:t>
             </a:fld>
-            <a:endParaRPr lang="de-DE"/>
+            <a:endParaRPr lang="de-DE" dirty="0"/>
           </a:p>
         </p:txBody>
       </p:sp>
@@ -11619,9 +11633,16 @@
         <p:spPr/>
         <p:txBody>
           <a:bodyPr/>
-          <a:lstStyle/>
+          <a:lstStyle>
+            <a:lvl1pPr>
+              <a:defRPr>
+                <a:latin typeface="+mn-lt"/>
+                <a:ea typeface="Roboto" panose="02000000000000000000" pitchFamily="2" charset="0"/>
+              </a:defRPr>
+            </a:lvl1pPr>
+          </a:lstStyle>
           <a:p>
-            <a:endParaRPr lang="de-DE"/>
+            <a:endParaRPr lang="de-DE" dirty="0"/>
           </a:p>
         </p:txBody>
       </p:sp>
@@ -11650,7 +11671,7 @@
               <a:rPr lang="de-DE" smtClean="0"/>
               <a:t>‹Nr.›</a:t>
             </a:fld>
-            <a:endParaRPr lang="de-DE"/>
+            <a:endParaRPr lang="de-DE" dirty="0"/>
           </a:p>
         </p:txBody>
       </p:sp>
@@ -11792,7 +11813,7 @@
           <a:p>
             <a:fld id="{4DCA6C4A-C3BE-4614-8178-1E634F454DE2}" type="datetimeFigureOut">
               <a:rPr lang="de-DE" smtClean="0"/>
-              <a:t>27.04.2019</a:t>
+              <a:t>15.05.2019</a:t>
             </a:fld>
             <a:endParaRPr lang="de-DE"/>
           </a:p>
@@ -12000,7 +12021,7 @@
           <a:p>
             <a:fld id="{4DCA6C4A-C3BE-4614-8178-1E634F454DE2}" type="datetimeFigureOut">
               <a:rPr lang="de-DE" smtClean="0"/>
-              <a:t>27.04.2019</a:t>
+              <a:t>15.05.2019</a:t>
             </a:fld>
             <a:endParaRPr lang="de-DE"/>
           </a:p>
@@ -12112,7 +12133,7 @@
           <a:lstStyle/>
           <a:p>
             <a:r>
-              <a:rPr lang="de-DE"/>
+              <a:rPr lang="de-DE" dirty="0"/>
               <a:t>Mastertitelformat bearbeiten</a:t>
             </a:r>
           </a:p>
@@ -12198,7 +12219,7 @@
           <a:p>
             <a:fld id="{4DCA6C4A-C3BE-4614-8178-1E634F454DE2}" type="datetimeFigureOut">
               <a:rPr lang="de-DE" smtClean="0"/>
-              <a:t>27.04.2019</a:t>
+              <a:t>15.05.2019</a:t>
             </a:fld>
             <a:endParaRPr lang="de-DE"/>
           </a:p>
@@ -12319,7 +12340,7 @@
           </a:lstStyle>
           <a:p>
             <a:r>
-              <a:rPr lang="de-DE"/>
+              <a:rPr lang="de-DE" dirty="0"/>
               <a:t>Mastertitelformat bearbeiten</a:t>
             </a:r>
           </a:p>
@@ -12444,7 +12465,7 @@
           <a:p>
             <a:pPr lvl="0"/>
             <a:r>
-              <a:rPr lang="de-DE"/>
+              <a:rPr lang="de-DE" dirty="0"/>
               <a:t>Mastertextformat bearbeiten</a:t>
             </a:r>
           </a:p>
@@ -12473,9 +12494,9 @@
           <a:p>
             <a:fld id="{4DCA6C4A-C3BE-4614-8178-1E634F454DE2}" type="datetimeFigureOut">
               <a:rPr lang="de-DE" smtClean="0"/>
-              <a:t>27.04.2019</a:t>
+              <a:t>15.05.2019</a:t>
             </a:fld>
-            <a:endParaRPr lang="de-DE"/>
+            <a:endParaRPr lang="de-DE" dirty="0"/>
           </a:p>
         </p:txBody>
       </p:sp>
@@ -12738,7 +12759,7 @@
           <a:p>
             <a:fld id="{4DCA6C4A-C3BE-4614-8178-1E634F454DE2}" type="datetimeFigureOut">
               <a:rPr lang="de-DE" smtClean="0"/>
-              <a:t>27.04.2019</a:t>
+              <a:t>15.05.2019</a:t>
             </a:fld>
             <a:endParaRPr lang="de-DE"/>
           </a:p>
@@ -12926,7 +12947,7 @@
           <a:p>
             <a:pPr lvl="0"/>
             <a:r>
-              <a:rPr lang="de-DE"/>
+              <a:rPr lang="de-DE" dirty="0"/>
               <a:t>Mastertextformat bearbeiten</a:t>
             </a:r>
           </a:p>
@@ -13150,7 +13171,7 @@
           <a:p>
             <a:fld id="{4DCA6C4A-C3BE-4614-8178-1E634F454DE2}" type="datetimeFigureOut">
               <a:rPr lang="de-DE" smtClean="0"/>
-              <a:t>27.04.2019</a:t>
+              <a:t>15.05.2019</a:t>
             </a:fld>
             <a:endParaRPr lang="de-DE"/>
           </a:p>
@@ -13291,7 +13312,7 @@
           <a:p>
             <a:fld id="{4DCA6C4A-C3BE-4614-8178-1E634F454DE2}" type="datetimeFigureOut">
               <a:rPr lang="de-DE" smtClean="0"/>
-              <a:t>27.04.2019</a:t>
+              <a:t>15.05.2019</a:t>
             </a:fld>
             <a:endParaRPr lang="de-DE"/>
           </a:p>
@@ -13404,9 +13425,9 @@
           <a:p>
             <a:fld id="{4DCA6C4A-C3BE-4614-8178-1E634F454DE2}" type="datetimeFigureOut">
               <a:rPr lang="de-DE" smtClean="0"/>
-              <a:t>27.04.2019</a:t>
+              <a:t>15.05.2019</a:t>
             </a:fld>
-            <a:endParaRPr lang="de-DE"/>
+            <a:endParaRPr lang="de-DE" dirty="0"/>
           </a:p>
         </p:txBody>
       </p:sp>
@@ -13715,7 +13736,7 @@
           <a:p>
             <a:fld id="{4DCA6C4A-C3BE-4614-8178-1E634F454DE2}" type="datetimeFigureOut">
               <a:rPr lang="de-DE" smtClean="0"/>
-              <a:t>27.04.2019</a:t>
+              <a:t>15.05.2019</a:t>
             </a:fld>
             <a:endParaRPr lang="de-DE"/>
           </a:p>
@@ -14003,7 +14024,7 @@
           <a:p>
             <a:fld id="{4DCA6C4A-C3BE-4614-8178-1E634F454DE2}" type="datetimeFigureOut">
               <a:rPr lang="de-DE" smtClean="0"/>
-              <a:t>27.04.2019</a:t>
+              <a:t>15.05.2019</a:t>
             </a:fld>
             <a:endParaRPr lang="de-DE"/>
           </a:p>
@@ -14080,9 +14101,12 @@
 <p:sldMaster xmlns:a="http://schemas.openxmlformats.org/drawingml/2006/main" xmlns:r="http://schemas.openxmlformats.org/officeDocument/2006/relationships" xmlns:p="http://schemas.openxmlformats.org/presentationml/2006/main">
   <p:cSld>
     <p:bg>
-      <p:bgRef idx="1001">
-        <a:schemeClr val="bg1"/>
-      </p:bgRef>
+      <p:bgPr>
+        <a:solidFill>
+          <a:schemeClr val="bg1"/>
+        </a:solidFill>
+        <a:effectLst/>
+      </p:bgPr>
     </p:bg>
     <p:spTree>
       <p:nvGrpSpPr>
@@ -14130,7 +14154,7 @@
           <a:lstStyle/>
           <a:p>
             <a:r>
-              <a:rPr lang="de-DE"/>
+              <a:rPr lang="de-DE" dirty="0"/>
               <a:t>Mastertitelformat bearbeiten</a:t>
             </a:r>
           </a:p>
@@ -14169,35 +14193,35 @@
           <a:p>
             <a:pPr lvl="0"/>
             <a:r>
-              <a:rPr lang="de-DE"/>
+              <a:rPr lang="de-DE" dirty="0"/>
               <a:t>Mastertextformat bearbeiten</a:t>
             </a:r>
           </a:p>
           <a:p>
             <a:pPr lvl="1"/>
             <a:r>
-              <a:rPr lang="de-DE"/>
+              <a:rPr lang="de-DE" dirty="0"/>
               <a:t>Zweite Ebene</a:t>
             </a:r>
           </a:p>
           <a:p>
             <a:pPr lvl="2"/>
             <a:r>
-              <a:rPr lang="de-DE"/>
+              <a:rPr lang="de-DE" dirty="0"/>
               <a:t>Dritte Ebene</a:t>
             </a:r>
           </a:p>
           <a:p>
             <a:pPr lvl="3"/>
             <a:r>
-              <a:rPr lang="de-DE"/>
+              <a:rPr lang="de-DE" dirty="0"/>
               <a:t>Vierte Ebene</a:t>
             </a:r>
           </a:p>
           <a:p>
             <a:pPr lvl="4"/>
             <a:r>
-              <a:rPr lang="de-DE"/>
+              <a:rPr lang="de-DE" dirty="0"/>
               <a:t>Fünfte Ebene</a:t>
             </a:r>
           </a:p>
@@ -14238,15 +14262,18 @@
                     <a:tint val="75000"/>
                   </a:schemeClr>
                 </a:solidFill>
+                <a:latin typeface="+mn-lt"/>
+                <a:ea typeface="Roboto" panose="02000000000000000000" pitchFamily="2" charset="0"/>
               </a:defRPr>
             </a:lvl1pPr>
           </a:lstStyle>
           <a:p>
             <a:fld id="{4DCA6C4A-C3BE-4614-8178-1E634F454DE2}" type="datetimeFigureOut">
               <a:rPr lang="de-DE" smtClean="0"/>
-              <a:t>27.04.2019</a:t>
+              <a:pPr/>
+              <a:t>15.05.2019</a:t>
             </a:fld>
-            <a:endParaRPr lang="de-DE"/>
+            <a:endParaRPr lang="de-DE" dirty="0"/>
           </a:p>
         </p:txBody>
       </p:sp>
@@ -14285,11 +14312,13 @@
                     <a:tint val="75000"/>
                   </a:schemeClr>
                 </a:solidFill>
+                <a:latin typeface="+mn-lt"/>
+                <a:ea typeface="Roboto" panose="02000000000000000000" pitchFamily="2" charset="0"/>
               </a:defRPr>
             </a:lvl1pPr>
           </a:lstStyle>
           <a:p>
-            <a:endParaRPr lang="de-DE"/>
+            <a:endParaRPr lang="de-DE" dirty="0"/>
           </a:p>
         </p:txBody>
       </p:sp>
@@ -14328,15 +14357,18 @@
                     <a:tint val="75000"/>
                   </a:schemeClr>
                 </a:solidFill>
+                <a:latin typeface="+mn-lt"/>
+                <a:ea typeface="Roboto" panose="02000000000000000000" pitchFamily="2" charset="0"/>
               </a:defRPr>
             </a:lvl1pPr>
           </a:lstStyle>
           <a:p>
             <a:fld id="{AA3BF397-6195-4832-AA9D-24E55560F78B}" type="slidenum">
               <a:rPr lang="de-DE" smtClean="0"/>
+              <a:pPr/>
               <a:t>‹Nr.›</a:t>
             </a:fld>
-            <a:endParaRPr lang="de-DE"/>
+            <a:endParaRPr lang="de-DE" dirty="0"/>
           </a:p>
         </p:txBody>
       </p:sp>
@@ -14376,7 +14408,7 @@
             <a:schemeClr val="tx1"/>
           </a:solidFill>
           <a:latin typeface="+mj-lt"/>
-          <a:ea typeface="+mj-ea"/>
+          <a:ea typeface="Roboto" panose="02000000000000000000" pitchFamily="2" charset="0"/>
           <a:cs typeface="+mj-cs"/>
         </a:defRPr>
       </a:lvl1pPr>
@@ -14396,7 +14428,7 @@
             <a:schemeClr val="tx1"/>
           </a:solidFill>
           <a:latin typeface="+mn-lt"/>
-          <a:ea typeface="+mn-ea"/>
+          <a:ea typeface="Roboto" panose="02000000000000000000" pitchFamily="2" charset="0"/>
           <a:cs typeface="+mn-cs"/>
         </a:defRPr>
       </a:lvl1pPr>
@@ -14414,7 +14446,7 @@
             <a:schemeClr val="tx1"/>
           </a:solidFill>
           <a:latin typeface="+mn-lt"/>
-          <a:ea typeface="+mn-ea"/>
+          <a:ea typeface="Roboto" panose="02000000000000000000" pitchFamily="2" charset="0"/>
           <a:cs typeface="+mn-cs"/>
         </a:defRPr>
       </a:lvl2pPr>
@@ -14431,8 +14463,8 @@
           <a:solidFill>
             <a:schemeClr val="tx1"/>
           </a:solidFill>
-          <a:latin typeface="+mn-lt"/>
-          <a:ea typeface="+mn-ea"/>
+          <a:latin typeface="Roboto" panose="02000000000000000000" pitchFamily="2" charset="0"/>
+          <a:ea typeface="Roboto" panose="02000000000000000000" pitchFamily="2" charset="0"/>
           <a:cs typeface="+mn-cs"/>
         </a:defRPr>
       </a:lvl3pPr>
@@ -14450,7 +14482,7 @@
             <a:schemeClr val="tx1"/>
           </a:solidFill>
           <a:latin typeface="+mn-lt"/>
-          <a:ea typeface="+mn-ea"/>
+          <a:ea typeface="Roboto" panose="02000000000000000000" pitchFamily="2" charset="0"/>
           <a:cs typeface="+mn-cs"/>
         </a:defRPr>
       </a:lvl4pPr>
@@ -14468,7 +14500,7 @@
             <a:schemeClr val="tx1"/>
           </a:solidFill>
           <a:latin typeface="+mn-lt"/>
-          <a:ea typeface="+mn-ea"/>
+          <a:ea typeface="Roboto" panose="02000000000000000000" pitchFamily="2" charset="0"/>
           <a:cs typeface="+mn-cs"/>
         </a:defRPr>
       </a:lvl5pPr>
@@ -15601,8 +15633,8 @@
         </p:nvSpPr>
         <p:spPr>
           <a:xfrm>
-            <a:off x="8738979" y="6492875"/>
-            <a:ext cx="3344737" cy="230832"/>
+            <a:off x="8410223" y="6492875"/>
+            <a:ext cx="3673494" cy="230832"/>
           </a:xfrm>
           <a:prstGeom prst="rect">
             <a:avLst/>
@@ -15616,26 +15648,26 @@
           <a:lstStyle/>
           <a:p>
             <a:r>
-              <a:rPr lang="de-DE" sz="900"/>
+              <a:rPr lang="de-DE" sz="900" dirty="0"/>
               <a:t>"</a:t>
             </a:r>
             <a:r>
-              <a:rPr lang="de-DE" sz="900">
+              <a:rPr lang="de-DE" sz="900" dirty="0">
                 <a:hlinkClick r:id="rId3" tooltip="http://commons.wikimedia.org/wiki/File:User_icon_2.svg"/>
               </a:rPr>
               <a:t>Dieses Foto</a:t>
             </a:r>
             <a:r>
-              <a:rPr lang="de-DE" sz="900"/>
+              <a:rPr lang="de-DE" sz="900" dirty="0"/>
               <a:t>" von Unbekannter Autor ist lizenziert gemäß </a:t>
             </a:r>
             <a:r>
-              <a:rPr lang="de-DE" sz="900">
+              <a:rPr lang="de-DE" sz="900" dirty="0">
                 <a:hlinkClick r:id="rId4" tooltip="https://creativecommons.org/licenses/by-sa/3.0/"/>
               </a:rPr>
               <a:t>CC BY-SA</a:t>
             </a:r>
-            <a:endParaRPr lang="de-DE" sz="900"/>
+            <a:endParaRPr lang="de-DE" sz="900" dirty="0"/>
           </a:p>
         </p:txBody>
       </p:sp>
@@ -17372,110 +17404,16 @@
         <a:srgbClr val="954F72"/>
       </a:folHlink>
     </a:clrScheme>
-    <a:fontScheme name="Office">
+    <a:fontScheme name="Roboto">
       <a:majorFont>
-        <a:latin typeface="Calibri Light" panose="020F0302020204030204"/>
+        <a:latin typeface="Roboto Light"/>
         <a:ea typeface=""/>
         <a:cs typeface=""/>
-        <a:font script="Jpan" typeface="游ゴシック Light"/>
-        <a:font script="Hang" typeface="맑은 고딕"/>
-        <a:font script="Hans" typeface="等线 Light"/>
-        <a:font script="Hant" typeface="新細明體"/>
-        <a:font script="Arab" typeface="Times New Roman"/>
-        <a:font script="Hebr" typeface="Times New Roman"/>
-        <a:font script="Thai" typeface="Angsana New"/>
-        <a:font script="Ethi" typeface="Nyala"/>
-        <a:font script="Beng" typeface="Vrinda"/>
-        <a:font script="Gujr" typeface="Shruti"/>
-        <a:font script="Khmr" typeface="MoolBoran"/>
-        <a:font script="Knda" typeface="Tunga"/>
-        <a:font script="Guru" typeface="Raavi"/>
-        <a:font script="Cans" typeface="Euphemia"/>
-        <a:font script="Cher" typeface="Plantagenet Cherokee"/>
-        <a:font script="Yiii" typeface="Microsoft Yi Baiti"/>
-        <a:font script="Tibt" typeface="Microsoft Himalaya"/>
-        <a:font script="Thaa" typeface="MV Boli"/>
-        <a:font script="Deva" typeface="Mangal"/>
-        <a:font script="Telu" typeface="Gautami"/>
-        <a:font script="Taml" typeface="Latha"/>
-        <a:font script="Syrc" typeface="Estrangelo Edessa"/>
-        <a:font script="Orya" typeface="Kalinga"/>
-        <a:font script="Mlym" typeface="Kartika"/>
-        <a:font script="Laoo" typeface="DokChampa"/>
-        <a:font script="Sinh" typeface="Iskoola Pota"/>
-        <a:font script="Mong" typeface="Mongolian Baiti"/>
-        <a:font script="Viet" typeface="Times New Roman"/>
-        <a:font script="Uigh" typeface="Microsoft Uighur"/>
-        <a:font script="Geor" typeface="Sylfaen"/>
-        <a:font script="Armn" typeface="Arial"/>
-        <a:font script="Bugi" typeface="Leelawadee UI"/>
-        <a:font script="Bopo" typeface="Microsoft JhengHei"/>
-        <a:font script="Java" typeface="Javanese Text"/>
-        <a:font script="Lisu" typeface="Segoe UI"/>
-        <a:font script="Mymr" typeface="Myanmar Text"/>
-        <a:font script="Nkoo" typeface="Ebrima"/>
-        <a:font script="Olck" typeface="Nirmala UI"/>
-        <a:font script="Osma" typeface="Ebrima"/>
-        <a:font script="Phag" typeface="Phagspa"/>
-        <a:font script="Syrn" typeface="Estrangelo Edessa"/>
-        <a:font script="Syrj" typeface="Estrangelo Edessa"/>
-        <a:font script="Syre" typeface="Estrangelo Edessa"/>
-        <a:font script="Sora" typeface="Nirmala UI"/>
-        <a:font script="Tale" typeface="Microsoft Tai Le"/>
-        <a:font script="Talu" typeface="Microsoft New Tai Lue"/>
-        <a:font script="Tfng" typeface="Ebrima"/>
       </a:majorFont>
       <a:minorFont>
-        <a:latin typeface="Calibri" panose="020F0502020204030204"/>
+        <a:latin typeface="Roboto"/>
         <a:ea typeface=""/>
         <a:cs typeface=""/>
-        <a:font script="Jpan" typeface="游ゴシック"/>
-        <a:font script="Hang" typeface="맑은 고딕"/>
-        <a:font script="Hans" typeface="等线"/>
-        <a:font script="Hant" typeface="新細明體"/>
-        <a:font script="Arab" typeface="Arial"/>
-        <a:font script="Hebr" typeface="Arial"/>
-        <a:font script="Thai" typeface="Cordia New"/>
-        <a:font script="Ethi" typeface="Nyala"/>
-        <a:font script="Beng" typeface="Vrinda"/>
-        <a:font script="Gujr" typeface="Shruti"/>
-        <a:font script="Khmr" typeface="DaunPenh"/>
-        <a:font script="Knda" typeface="Tunga"/>
-        <a:font script="Guru" typeface="Raavi"/>
-        <a:font script="Cans" typeface="Euphemia"/>
-        <a:font script="Cher" typeface="Plantagenet Cherokee"/>
-        <a:font script="Yiii" typeface="Microsoft Yi Baiti"/>
-        <a:font script="Tibt" typeface="Microsoft Himalaya"/>
-        <a:font script="Thaa" typeface="MV Boli"/>
-        <a:font script="Deva" typeface="Mangal"/>
-        <a:font script="Telu" typeface="Gautami"/>
-        <a:font script="Taml" typeface="Latha"/>
-        <a:font script="Syrc" typeface="Estrangelo Edessa"/>
-        <a:font script="Orya" typeface="Kalinga"/>
-        <a:font script="Mlym" typeface="Kartika"/>
-        <a:font script="Laoo" typeface="DokChampa"/>
-        <a:font script="Sinh" typeface="Iskoola Pota"/>
-        <a:font script="Mong" typeface="Mongolian Baiti"/>
-        <a:font script="Viet" typeface="Arial"/>
-        <a:font script="Uigh" typeface="Microsoft Uighur"/>
-        <a:font script="Geor" typeface="Sylfaen"/>
-        <a:font script="Armn" typeface="Arial"/>
-        <a:font script="Bugi" typeface="Leelawadee UI"/>
-        <a:font script="Bopo" typeface="Microsoft JhengHei"/>
-        <a:font script="Java" typeface="Javanese Text"/>
-        <a:font script="Lisu" typeface="Segoe UI"/>
-        <a:font script="Mymr" typeface="Myanmar Text"/>
-        <a:font script="Nkoo" typeface="Ebrima"/>
-        <a:font script="Olck" typeface="Nirmala UI"/>
-        <a:font script="Osma" typeface="Ebrima"/>
-        <a:font script="Phag" typeface="Phagspa"/>
-        <a:font script="Syrn" typeface="Estrangelo Edessa"/>
-        <a:font script="Syrj" typeface="Estrangelo Edessa"/>
-        <a:font script="Syre" typeface="Estrangelo Edessa"/>
-        <a:font script="Sora" typeface="Nirmala UI"/>
-        <a:font script="Tale" typeface="Microsoft Tai Le"/>
-        <a:font script="Talu" typeface="Microsoft New Tai Lue"/>
-        <a:font script="Tfng" typeface="Ebrima"/>
       </a:minorFont>
     </a:fontScheme>
     <a:fmtScheme name="Office">

</xml_diff>

<commit_message>
feat: wip restructure contents
</commit_message>
<xml_diff>
--- a/powerpoint/Consumer-Driven Contract Tests using PACT.pptx
+++ b/powerpoint/Consumer-Driven Contract Tests using PACT.pptx
@@ -5,7 +5,7 @@
     <p:sldMasterId id="2147483648" r:id="rId1"/>
   </p:sldMasterIdLst>
   <p:notesMasterIdLst>
-    <p:notesMasterId r:id="rId17"/>
+    <p:notesMasterId r:id="rId28"/>
   </p:notesMasterIdLst>
   <p:sldIdLst>
     <p:sldId id="256" r:id="rId2"/>
@@ -23,6 +23,17 @@
     <p:sldId id="272" r:id="rId14"/>
     <p:sldId id="262" r:id="rId15"/>
     <p:sldId id="268" r:id="rId16"/>
+    <p:sldId id="273" r:id="rId17"/>
+    <p:sldId id="274" r:id="rId18"/>
+    <p:sldId id="275" r:id="rId19"/>
+    <p:sldId id="276" r:id="rId20"/>
+    <p:sldId id="279" r:id="rId21"/>
+    <p:sldId id="277" r:id="rId22"/>
+    <p:sldId id="280" r:id="rId23"/>
+    <p:sldId id="278" r:id="rId24"/>
+    <p:sldId id="281" r:id="rId25"/>
+    <p:sldId id="282" r:id="rId26"/>
+    <p:sldId id="283" r:id="rId27"/>
   </p:sldIdLst>
   <p:sldSz cx="12192000" cy="6858000"/>
   <p:notesSz cx="6858000" cy="9144000"/>
@@ -12408,6 +12419,490 @@
 </p:notes>
 </file>
 
+<file path=ppt/notesSlides/notesSlide10.xml><?xml version="1.0" encoding="utf-8"?>
+<p:notes xmlns:a="http://schemas.openxmlformats.org/drawingml/2006/main" xmlns:r="http://schemas.openxmlformats.org/officeDocument/2006/relationships" xmlns:p="http://schemas.openxmlformats.org/presentationml/2006/main">
+  <p:cSld>
+    <p:spTree>
+      <p:nvGrpSpPr>
+        <p:cNvPr id="1" name=""/>
+        <p:cNvGrpSpPr/>
+        <p:nvPr/>
+      </p:nvGrpSpPr>
+      <p:grpSpPr>
+        <a:xfrm>
+          <a:off x="0" y="0"/>
+          <a:ext cx="0" cy="0"/>
+          <a:chOff x="0" y="0"/>
+          <a:chExt cx="0" cy="0"/>
+        </a:xfrm>
+      </p:grpSpPr>
+      <p:sp>
+        <p:nvSpPr>
+          <p:cNvPr id="2" name="Folienbildplatzhalter 1"/>
+          <p:cNvSpPr>
+            <a:spLocks noGrp="1" noRot="1" noChangeAspect="1"/>
+          </p:cNvSpPr>
+          <p:nvPr>
+            <p:ph type="sldImg"/>
+          </p:nvPr>
+        </p:nvSpPr>
+        <p:spPr/>
+      </p:sp>
+      <p:sp>
+        <p:nvSpPr>
+          <p:cNvPr id="3" name="Notizenplatzhalter 2"/>
+          <p:cNvSpPr>
+            <a:spLocks noGrp="1"/>
+          </p:cNvSpPr>
+          <p:nvPr>
+            <p:ph type="body" idx="1"/>
+          </p:nvPr>
+        </p:nvSpPr>
+        <p:spPr/>
+        <p:txBody>
+          <a:bodyPr/>
+          <a:lstStyle/>
+          <a:p>
+            <a:endParaRPr lang="de-DE" dirty="0"/>
+          </a:p>
+        </p:txBody>
+      </p:sp>
+      <p:sp>
+        <p:nvSpPr>
+          <p:cNvPr id="4" name="Foliennummernplatzhalter 3"/>
+          <p:cNvSpPr>
+            <a:spLocks noGrp="1"/>
+          </p:cNvSpPr>
+          <p:nvPr>
+            <p:ph type="sldNum" sz="quarter" idx="5"/>
+          </p:nvPr>
+        </p:nvSpPr>
+        <p:spPr/>
+        <p:txBody>
+          <a:bodyPr/>
+          <a:lstStyle/>
+          <a:p>
+            <a:fld id="{5D492825-D2FA-4478-B79B-910ECE6D7AEF}" type="slidenum">
+              <a:rPr lang="de-DE" smtClean="0"/>
+              <a:t>16</a:t>
+            </a:fld>
+            <a:endParaRPr lang="de-DE"/>
+          </a:p>
+        </p:txBody>
+      </p:sp>
+    </p:spTree>
+    <p:extLst>
+      <p:ext uri="{BB962C8B-B14F-4D97-AF65-F5344CB8AC3E}">
+        <p14:creationId xmlns:p14="http://schemas.microsoft.com/office/powerpoint/2010/main" val="93465915"/>
+      </p:ext>
+    </p:extLst>
+  </p:cSld>
+  <p:clrMapOvr>
+    <a:masterClrMapping/>
+  </p:clrMapOvr>
+</p:notes>
+</file>
+
+<file path=ppt/notesSlides/notesSlide11.xml><?xml version="1.0" encoding="utf-8"?>
+<p:notes xmlns:a="http://schemas.openxmlformats.org/drawingml/2006/main" xmlns:r="http://schemas.openxmlformats.org/officeDocument/2006/relationships" xmlns:p="http://schemas.openxmlformats.org/presentationml/2006/main">
+  <p:cSld>
+    <p:spTree>
+      <p:nvGrpSpPr>
+        <p:cNvPr id="1" name=""/>
+        <p:cNvGrpSpPr/>
+        <p:nvPr/>
+      </p:nvGrpSpPr>
+      <p:grpSpPr>
+        <a:xfrm>
+          <a:off x="0" y="0"/>
+          <a:ext cx="0" cy="0"/>
+          <a:chOff x="0" y="0"/>
+          <a:chExt cx="0" cy="0"/>
+        </a:xfrm>
+      </p:grpSpPr>
+      <p:sp>
+        <p:nvSpPr>
+          <p:cNvPr id="2" name="Folienbildplatzhalter 1"/>
+          <p:cNvSpPr>
+            <a:spLocks noGrp="1" noRot="1" noChangeAspect="1"/>
+          </p:cNvSpPr>
+          <p:nvPr>
+            <p:ph type="sldImg"/>
+          </p:nvPr>
+        </p:nvSpPr>
+        <p:spPr/>
+      </p:sp>
+      <p:sp>
+        <p:nvSpPr>
+          <p:cNvPr id="3" name="Notizenplatzhalter 2"/>
+          <p:cNvSpPr>
+            <a:spLocks noGrp="1"/>
+          </p:cNvSpPr>
+          <p:nvPr>
+            <p:ph type="body" idx="1"/>
+          </p:nvPr>
+        </p:nvSpPr>
+        <p:spPr/>
+        <p:txBody>
+          <a:bodyPr/>
+          <a:lstStyle/>
+          <a:p>
+            <a:r>
+              <a:rPr lang="de-DE" dirty="0"/>
+              <a:t>PACT Broker für die Verteilung der PACT </a:t>
+            </a:r>
+            <a:r>
+              <a:rPr lang="de-DE" dirty="0" err="1"/>
+              <a:t>files</a:t>
+            </a:r>
+            <a:r>
+              <a:rPr lang="de-DE" dirty="0"/>
+              <a:t> zwischen allen beteiligten</a:t>
+            </a:r>
+          </a:p>
+          <a:p>
+            <a:pPr marL="171450" indent="-171450">
+              <a:buFontTx/>
+              <a:buChar char="-"/>
+            </a:pPr>
+            <a:r>
+              <a:rPr lang="de-DE" dirty="0"/>
+              <a:t>Einfach Zugänglich für alle Interessenten</a:t>
+            </a:r>
+          </a:p>
+          <a:p>
+            <a:pPr marL="171450" indent="-171450">
+              <a:buFontTx/>
+              <a:buChar char="-"/>
+            </a:pPr>
+            <a:r>
+              <a:rPr lang="de-DE" dirty="0"/>
+              <a:t>Automatische Einbindung neuer Tests in die Provider </a:t>
+            </a:r>
+            <a:r>
+              <a:rPr lang="de-DE" dirty="0" err="1"/>
+              <a:t>Suites</a:t>
+            </a:r>
+            <a:endParaRPr lang="de-DE" dirty="0"/>
+          </a:p>
+          <a:p>
+            <a:pPr marL="171450" indent="-171450">
+              <a:buFontTx/>
+              <a:buChar char="-"/>
+            </a:pPr>
+            <a:r>
+              <a:rPr lang="de-DE" dirty="0"/>
+              <a:t>Versionierung / Kompatibilitätsmatrix (welcher Service ist mit welchem Client kompatibel)</a:t>
+            </a:r>
+          </a:p>
+          <a:p>
+            <a:pPr marL="171450" indent="-171450">
+              <a:buFontTx/>
+              <a:buChar char="-"/>
+            </a:pPr>
+            <a:r>
+              <a:rPr lang="de-DE" dirty="0"/>
+              <a:t>Status-Monitoring in der Web UI</a:t>
+            </a:r>
+          </a:p>
+          <a:p>
+            <a:pPr marL="171450" indent="-171450">
+              <a:buFontTx/>
+              <a:buChar char="-"/>
+            </a:pPr>
+            <a:endParaRPr lang="de-DE" dirty="0"/>
+          </a:p>
+        </p:txBody>
+      </p:sp>
+      <p:sp>
+        <p:nvSpPr>
+          <p:cNvPr id="4" name="Foliennummernplatzhalter 3"/>
+          <p:cNvSpPr>
+            <a:spLocks noGrp="1"/>
+          </p:cNvSpPr>
+          <p:nvPr>
+            <p:ph type="sldNum" sz="quarter" idx="5"/>
+          </p:nvPr>
+        </p:nvSpPr>
+        <p:spPr/>
+        <p:txBody>
+          <a:bodyPr/>
+          <a:lstStyle/>
+          <a:p>
+            <a:fld id="{5D492825-D2FA-4478-B79B-910ECE6D7AEF}" type="slidenum">
+              <a:rPr lang="de-DE" smtClean="0"/>
+              <a:t>22</a:t>
+            </a:fld>
+            <a:endParaRPr lang="de-DE"/>
+          </a:p>
+        </p:txBody>
+      </p:sp>
+    </p:spTree>
+    <p:extLst>
+      <p:ext uri="{BB962C8B-B14F-4D97-AF65-F5344CB8AC3E}">
+        <p14:creationId xmlns:p14="http://schemas.microsoft.com/office/powerpoint/2010/main" val="2253052555"/>
+      </p:ext>
+    </p:extLst>
+  </p:cSld>
+  <p:clrMapOvr>
+    <a:masterClrMapping/>
+  </p:clrMapOvr>
+</p:notes>
+</file>
+
+<file path=ppt/notesSlides/notesSlide12.xml><?xml version="1.0" encoding="utf-8"?>
+<p:notes xmlns:a="http://schemas.openxmlformats.org/drawingml/2006/main" xmlns:r="http://schemas.openxmlformats.org/officeDocument/2006/relationships" xmlns:p="http://schemas.openxmlformats.org/presentationml/2006/main">
+  <p:cSld>
+    <p:spTree>
+      <p:nvGrpSpPr>
+        <p:cNvPr id="1" name=""/>
+        <p:cNvGrpSpPr/>
+        <p:nvPr/>
+      </p:nvGrpSpPr>
+      <p:grpSpPr>
+        <a:xfrm>
+          <a:off x="0" y="0"/>
+          <a:ext cx="0" cy="0"/>
+          <a:chOff x="0" y="0"/>
+          <a:chExt cx="0" cy="0"/>
+        </a:xfrm>
+      </p:grpSpPr>
+      <p:sp>
+        <p:nvSpPr>
+          <p:cNvPr id="2" name="Folienbildplatzhalter 1"/>
+          <p:cNvSpPr>
+            <a:spLocks noGrp="1" noRot="1" noChangeAspect="1"/>
+          </p:cNvSpPr>
+          <p:nvPr>
+            <p:ph type="sldImg"/>
+          </p:nvPr>
+        </p:nvSpPr>
+        <p:spPr/>
+      </p:sp>
+      <p:sp>
+        <p:nvSpPr>
+          <p:cNvPr id="3" name="Notizenplatzhalter 2"/>
+          <p:cNvSpPr>
+            <a:spLocks noGrp="1"/>
+          </p:cNvSpPr>
+          <p:nvPr>
+            <p:ph type="body" idx="1"/>
+          </p:nvPr>
+        </p:nvSpPr>
+        <p:spPr/>
+        <p:txBody>
+          <a:bodyPr/>
+          <a:lstStyle/>
+          <a:p>
+            <a:r>
+              <a:rPr lang="de-DE" dirty="0"/>
+              <a:t>Ja es hilft:</a:t>
+            </a:r>
+          </a:p>
+          <a:p>
+            <a:pPr marL="171450" indent="-171450">
+              <a:buFontTx/>
+              <a:buChar char="-"/>
+            </a:pPr>
+            <a:r>
+              <a:rPr lang="de-DE" dirty="0"/>
+              <a:t>Geringer Aufwand für das erstellen eines PACT</a:t>
+            </a:r>
+          </a:p>
+          <a:p>
+            <a:pPr marL="171450" indent="-171450">
+              <a:buFontTx/>
+              <a:buChar char="-"/>
+            </a:pPr>
+            <a:r>
+              <a:rPr lang="de-DE" dirty="0"/>
+              <a:t>Hoher automatisierungsgrad möglich</a:t>
+            </a:r>
+          </a:p>
+          <a:p>
+            <a:pPr marL="171450" indent="-171450">
+              <a:buFontTx/>
+              <a:buChar char="-"/>
+            </a:pPr>
+            <a:r>
+              <a:rPr lang="de-DE" dirty="0"/>
+              <a:t>Unterstützt viele Technologien – Unterstützt den Microservice Ansatz</a:t>
+            </a:r>
+          </a:p>
+          <a:p>
+            <a:pPr marL="628650" lvl="1" indent="-171450">
+              <a:buFontTx/>
+              <a:buChar char="-"/>
+            </a:pPr>
+            <a:r>
+              <a:rPr lang="de-DE" dirty="0" err="1"/>
+              <a:t>Benuitze</a:t>
+            </a:r>
+            <a:r>
+              <a:rPr lang="de-DE" dirty="0"/>
+              <a:t> die Technologie, die am besten zur Problemlösung geeignet ist</a:t>
+            </a:r>
+          </a:p>
+        </p:txBody>
+      </p:sp>
+      <p:sp>
+        <p:nvSpPr>
+          <p:cNvPr id="4" name="Foliennummernplatzhalter 3"/>
+          <p:cNvSpPr>
+            <a:spLocks noGrp="1"/>
+          </p:cNvSpPr>
+          <p:nvPr>
+            <p:ph type="sldNum" sz="quarter" idx="5"/>
+          </p:nvPr>
+        </p:nvSpPr>
+        <p:spPr/>
+        <p:txBody>
+          <a:bodyPr/>
+          <a:lstStyle/>
+          <a:p>
+            <a:fld id="{5D492825-D2FA-4478-B79B-910ECE6D7AEF}" type="slidenum">
+              <a:rPr lang="de-DE" smtClean="0"/>
+              <a:t>25</a:t>
+            </a:fld>
+            <a:endParaRPr lang="de-DE"/>
+          </a:p>
+        </p:txBody>
+      </p:sp>
+    </p:spTree>
+    <p:extLst>
+      <p:ext uri="{BB962C8B-B14F-4D97-AF65-F5344CB8AC3E}">
+        <p14:creationId xmlns:p14="http://schemas.microsoft.com/office/powerpoint/2010/main" val="3861413857"/>
+      </p:ext>
+    </p:extLst>
+  </p:cSld>
+  <p:clrMapOvr>
+    <a:masterClrMapping/>
+  </p:clrMapOvr>
+</p:notes>
+</file>
+
+<file path=ppt/notesSlides/notesSlide13.xml><?xml version="1.0" encoding="utf-8"?>
+<p:notes xmlns:a="http://schemas.openxmlformats.org/drawingml/2006/main" xmlns:r="http://schemas.openxmlformats.org/officeDocument/2006/relationships" xmlns:p="http://schemas.openxmlformats.org/presentationml/2006/main">
+  <p:cSld>
+    <p:spTree>
+      <p:nvGrpSpPr>
+        <p:cNvPr id="1" name=""/>
+        <p:cNvGrpSpPr/>
+        <p:nvPr/>
+      </p:nvGrpSpPr>
+      <p:grpSpPr>
+        <a:xfrm>
+          <a:off x="0" y="0"/>
+          <a:ext cx="0" cy="0"/>
+          <a:chOff x="0" y="0"/>
+          <a:chExt cx="0" cy="0"/>
+        </a:xfrm>
+      </p:grpSpPr>
+      <p:sp>
+        <p:nvSpPr>
+          <p:cNvPr id="2" name="Folienbildplatzhalter 1"/>
+          <p:cNvSpPr>
+            <a:spLocks noGrp="1" noRot="1" noChangeAspect="1"/>
+          </p:cNvSpPr>
+          <p:nvPr>
+            <p:ph type="sldImg"/>
+          </p:nvPr>
+        </p:nvSpPr>
+        <p:spPr/>
+      </p:sp>
+      <p:sp>
+        <p:nvSpPr>
+          <p:cNvPr id="3" name="Notizenplatzhalter 2"/>
+          <p:cNvSpPr>
+            <a:spLocks noGrp="1"/>
+          </p:cNvSpPr>
+          <p:nvPr>
+            <p:ph type="body" idx="1"/>
+          </p:nvPr>
+        </p:nvSpPr>
+        <p:spPr/>
+        <p:txBody>
+          <a:bodyPr/>
+          <a:lstStyle/>
+          <a:p>
+            <a:r>
+              <a:rPr lang="de-DE" dirty="0"/>
+              <a:t>Letzte Empfehlungen:</a:t>
+            </a:r>
+          </a:p>
+          <a:p>
+            <a:pPr marL="171450" indent="-171450">
+              <a:buFontTx/>
+              <a:buChar char="-"/>
+            </a:pPr>
+            <a:r>
+              <a:rPr lang="de-DE" dirty="0"/>
+              <a:t>Tests nur für die Kommunikation nutzen – Keine Fachlichkeit testen</a:t>
+            </a:r>
+          </a:p>
+          <a:p>
+            <a:pPr marL="628650" lvl="1" indent="-171450">
+              <a:buFontTx/>
+              <a:buChar char="-"/>
+            </a:pPr>
+            <a:r>
+              <a:rPr lang="de-DE" dirty="0"/>
+              <a:t>Wird schnell instabil – Unit Tests o. </a:t>
+            </a:r>
+            <a:r>
+              <a:rPr lang="de-DE" dirty="0" err="1"/>
+              <a:t>Comoinent</a:t>
+            </a:r>
+            <a:r>
+              <a:rPr lang="de-DE" dirty="0"/>
+              <a:t> Tests sind dafür besser geeignet</a:t>
+            </a:r>
+          </a:p>
+          <a:p>
+            <a:pPr marL="171450" lvl="0" indent="-171450">
+              <a:buFontTx/>
+              <a:buChar char="-"/>
+            </a:pPr>
+            <a:endParaRPr lang="de-DE" dirty="0"/>
+          </a:p>
+        </p:txBody>
+      </p:sp>
+      <p:sp>
+        <p:nvSpPr>
+          <p:cNvPr id="4" name="Foliennummernplatzhalter 3"/>
+          <p:cNvSpPr>
+            <a:spLocks noGrp="1"/>
+          </p:cNvSpPr>
+          <p:nvPr>
+            <p:ph type="sldNum" sz="quarter" idx="5"/>
+          </p:nvPr>
+        </p:nvSpPr>
+        <p:spPr/>
+        <p:txBody>
+          <a:bodyPr/>
+          <a:lstStyle/>
+          <a:p>
+            <a:fld id="{5D492825-D2FA-4478-B79B-910ECE6D7AEF}" type="slidenum">
+              <a:rPr lang="de-DE" smtClean="0"/>
+              <a:t>26</a:t>
+            </a:fld>
+            <a:endParaRPr lang="de-DE"/>
+          </a:p>
+        </p:txBody>
+      </p:sp>
+    </p:spTree>
+    <p:extLst>
+      <p:ext uri="{BB962C8B-B14F-4D97-AF65-F5344CB8AC3E}">
+        <p14:creationId xmlns:p14="http://schemas.microsoft.com/office/powerpoint/2010/main" val="1254547977"/>
+      </p:ext>
+    </p:extLst>
+  </p:cSld>
+  <p:clrMapOvr>
+    <a:masterClrMapping/>
+  </p:clrMapOvr>
+</p:notes>
+</file>
+
 <file path=ppt/notesSlides/notesSlide2.xml><?xml version="1.0" encoding="utf-8"?>
 <p:notes xmlns:a="http://schemas.openxmlformats.org/drawingml/2006/main" xmlns:r="http://schemas.openxmlformats.org/officeDocument/2006/relationships" xmlns:p="http://schemas.openxmlformats.org/presentationml/2006/main">
   <p:cSld>
@@ -18586,10 +19081,10 @@
       </p:grpSpPr>
       <p:sp>
         <p:nvSpPr>
-          <p:cNvPr id="2" name="Titel 1">
+          <p:cNvPr id="6" name="Titel 5">
             <a:extLst>
               <a:ext uri="{FF2B5EF4-FFF2-40B4-BE49-F238E27FC236}">
-                <a16:creationId xmlns:a16="http://schemas.microsoft.com/office/drawing/2014/main" id="{E4DFEDED-B5C3-44D0-A5E6-A9AD2EF61530}"/>
+                <a16:creationId xmlns:a16="http://schemas.microsoft.com/office/drawing/2014/main" id="{8943D97B-30A6-43A5-9485-185A2B4CD8D3}"/>
               </a:ext>
             </a:extLst>
           </p:cNvPr>
@@ -18605,16 +19100,20 @@
           <a:bodyPr/>
           <a:lstStyle/>
           <a:p>
-            <a:endParaRPr lang="de-DE"/>
+            <a:r>
+              <a:rPr lang="en-US" b="1" dirty="0"/>
+              <a:t>Do you set your house on fire to test your smoke alarm? </a:t>
+            </a:r>
+            <a:endParaRPr lang="de-DE" b="1" dirty="0"/>
           </a:p>
         </p:txBody>
       </p:sp>
       <p:sp>
         <p:nvSpPr>
-          <p:cNvPr id="3" name="Textplatzhalter 2">
+          <p:cNvPr id="7" name="Textplatzhalter 6">
             <a:extLst>
               <a:ext uri="{FF2B5EF4-FFF2-40B4-BE49-F238E27FC236}">
-                <a16:creationId xmlns:a16="http://schemas.microsoft.com/office/drawing/2014/main" id="{68DFB7C0-DBEA-41A2-9B3F-8DAEA8B741A8}"/>
+                <a16:creationId xmlns:a16="http://schemas.microsoft.com/office/drawing/2014/main" id="{7CA30811-A701-4020-B5C6-979571A6B231}"/>
               </a:ext>
             </a:extLst>
           </p:cNvPr>
@@ -18638,6 +19137,1172 @@
     <p:extLst>
       <p:ext uri="{BB962C8B-B14F-4D97-AF65-F5344CB8AC3E}">
         <p14:creationId xmlns:p14="http://schemas.microsoft.com/office/powerpoint/2010/main" val="3305858863"/>
+      </p:ext>
+    </p:extLst>
+  </p:cSld>
+  <p:clrMapOvr>
+    <a:masterClrMapping/>
+  </p:clrMapOvr>
+</p:sld>
+</file>
+
+<file path=ppt/slides/slide16.xml><?xml version="1.0" encoding="utf-8"?>
+<p:sld xmlns:a="http://schemas.openxmlformats.org/drawingml/2006/main" xmlns:r="http://schemas.openxmlformats.org/officeDocument/2006/relationships" xmlns:p="http://schemas.openxmlformats.org/presentationml/2006/main">
+  <p:cSld>
+    <p:spTree>
+      <p:nvGrpSpPr>
+        <p:cNvPr id="1" name=""/>
+        <p:cNvGrpSpPr/>
+        <p:nvPr/>
+      </p:nvGrpSpPr>
+      <p:grpSpPr>
+        <a:xfrm>
+          <a:off x="0" y="0"/>
+          <a:ext cx="0" cy="0"/>
+          <a:chOff x="0" y="0"/>
+          <a:chExt cx="0" cy="0"/>
+        </a:xfrm>
+      </p:grpSpPr>
+      <p:sp>
+        <p:nvSpPr>
+          <p:cNvPr id="6" name="Titel 5">
+            <a:extLst>
+              <a:ext uri="{FF2B5EF4-FFF2-40B4-BE49-F238E27FC236}">
+                <a16:creationId xmlns:a16="http://schemas.microsoft.com/office/drawing/2014/main" id="{4A354D70-97D2-42FC-81C0-923D83CEDF25}"/>
+              </a:ext>
+            </a:extLst>
+          </p:cNvPr>
+          <p:cNvSpPr>
+            <a:spLocks noGrp="1"/>
+          </p:cNvSpPr>
+          <p:nvPr>
+            <p:ph type="title"/>
+          </p:nvPr>
+        </p:nvSpPr>
+        <p:spPr/>
+        <p:txBody>
+          <a:bodyPr/>
+          <a:lstStyle/>
+          <a:p>
+            <a:r>
+              <a:rPr lang="de-DE" dirty="0" err="1"/>
+              <a:t>What</a:t>
+            </a:r>
+            <a:r>
+              <a:rPr lang="de-DE" dirty="0"/>
+              <a:t> </a:t>
+            </a:r>
+            <a:r>
+              <a:rPr lang="de-DE" dirty="0" err="1"/>
+              <a:t>is</a:t>
+            </a:r>
+            <a:r>
+              <a:rPr lang="de-DE" dirty="0"/>
+              <a:t> a </a:t>
+            </a:r>
+            <a:r>
+              <a:rPr lang="de-DE" dirty="0" err="1"/>
+              <a:t>Pact</a:t>
+            </a:r>
+            <a:r>
+              <a:rPr lang="de-DE" dirty="0"/>
+              <a:t>?</a:t>
+            </a:r>
+          </a:p>
+        </p:txBody>
+      </p:sp>
+      <p:sp>
+        <p:nvSpPr>
+          <p:cNvPr id="7" name="Inhaltsplatzhalter 6">
+            <a:extLst>
+              <a:ext uri="{FF2B5EF4-FFF2-40B4-BE49-F238E27FC236}">
+                <a16:creationId xmlns:a16="http://schemas.microsoft.com/office/drawing/2014/main" id="{25BECAA1-42C0-4BA9-BB0C-1F5B33BAA11C}"/>
+              </a:ext>
+            </a:extLst>
+          </p:cNvPr>
+          <p:cNvSpPr>
+            <a:spLocks noGrp="1"/>
+          </p:cNvSpPr>
+          <p:nvPr>
+            <p:ph sz="half" idx="1"/>
+          </p:nvPr>
+        </p:nvSpPr>
+        <p:spPr/>
+        <p:txBody>
+          <a:bodyPr/>
+          <a:lstStyle/>
+          <a:p>
+            <a:r>
+              <a:rPr lang="de-DE" dirty="0"/>
+              <a:t>List </a:t>
+            </a:r>
+            <a:r>
+              <a:rPr lang="de-DE" dirty="0" err="1"/>
+              <a:t>of</a:t>
+            </a:r>
+            <a:r>
+              <a:rPr lang="de-DE" dirty="0"/>
+              <a:t> Interactions</a:t>
+            </a:r>
+          </a:p>
+          <a:p>
+            <a:r>
+              <a:rPr lang="de-DE" dirty="0"/>
+              <a:t>Interaction </a:t>
+            </a:r>
+          </a:p>
+          <a:p>
+            <a:pPr lvl="1"/>
+            <a:r>
+              <a:rPr lang="de-DE" dirty="0" err="1"/>
+              <a:t>Expected</a:t>
+            </a:r>
+            <a:r>
+              <a:rPr lang="de-DE" dirty="0"/>
+              <a:t> </a:t>
+            </a:r>
+            <a:r>
+              <a:rPr lang="de-DE" dirty="0" err="1"/>
+              <a:t>request</a:t>
+            </a:r>
+            <a:endParaRPr lang="de-DE" dirty="0"/>
+          </a:p>
+          <a:p>
+            <a:pPr lvl="1"/>
+            <a:r>
+              <a:rPr lang="de-DE" dirty="0" err="1"/>
+              <a:t>Expected</a:t>
+            </a:r>
+            <a:r>
+              <a:rPr lang="de-DE" dirty="0"/>
+              <a:t> minimal </a:t>
+            </a:r>
+            <a:r>
+              <a:rPr lang="de-DE" dirty="0" err="1"/>
+              <a:t>response</a:t>
+            </a:r>
+            <a:endParaRPr lang="de-DE" dirty="0"/>
+          </a:p>
+          <a:p>
+            <a:pPr lvl="1"/>
+            <a:r>
+              <a:rPr lang="de-DE" dirty="0"/>
+              <a:t>(Provider State)</a:t>
+            </a:r>
+          </a:p>
+        </p:txBody>
+      </p:sp>
+      <p:sp>
+        <p:nvSpPr>
+          <p:cNvPr id="8" name="Inhaltsplatzhalter 7">
+            <a:extLst>
+              <a:ext uri="{FF2B5EF4-FFF2-40B4-BE49-F238E27FC236}">
+                <a16:creationId xmlns:a16="http://schemas.microsoft.com/office/drawing/2014/main" id="{6799EFA1-855B-459F-ADEE-AA8FAB40D9B0}"/>
+              </a:ext>
+            </a:extLst>
+          </p:cNvPr>
+          <p:cNvSpPr>
+            <a:spLocks noGrp="1"/>
+          </p:cNvSpPr>
+          <p:nvPr>
+            <p:ph sz="half" idx="2"/>
+          </p:nvPr>
+        </p:nvSpPr>
+        <p:spPr/>
+        <p:txBody>
+          <a:bodyPr/>
+          <a:lstStyle/>
+          <a:p>
+            <a:endParaRPr lang="de-DE" dirty="0"/>
+          </a:p>
+        </p:txBody>
+      </p:sp>
+      <p:sp>
+        <p:nvSpPr>
+          <p:cNvPr id="9" name="Rechteck: eine Ecke abgeschnitten 8">
+            <a:extLst>
+              <a:ext uri="{FF2B5EF4-FFF2-40B4-BE49-F238E27FC236}">
+                <a16:creationId xmlns:a16="http://schemas.microsoft.com/office/drawing/2014/main" id="{D73828A1-1B41-487D-856D-DE545D90475F}"/>
+              </a:ext>
+            </a:extLst>
+          </p:cNvPr>
+          <p:cNvSpPr/>
+          <p:nvPr/>
+        </p:nvSpPr>
+        <p:spPr>
+          <a:xfrm>
+            <a:off x="7178488" y="1825625"/>
+            <a:ext cx="3361765" cy="4351338"/>
+          </a:xfrm>
+          <a:prstGeom prst="snip1Rect">
+            <a:avLst/>
+          </a:prstGeom>
+        </p:spPr>
+        <p:style>
+          <a:lnRef idx="2">
+            <a:schemeClr val="accent1">
+              <a:shade val="50000"/>
+            </a:schemeClr>
+          </a:lnRef>
+          <a:fillRef idx="1">
+            <a:schemeClr val="accent1"/>
+          </a:fillRef>
+          <a:effectRef idx="0">
+            <a:schemeClr val="accent1"/>
+          </a:effectRef>
+          <a:fontRef idx="minor">
+            <a:schemeClr val="lt1"/>
+          </a:fontRef>
+        </p:style>
+        <p:txBody>
+          <a:bodyPr rtlCol="0" anchor="b" anchorCtr="0"/>
+          <a:lstStyle/>
+          <a:p>
+            <a:pPr algn="ctr"/>
+            <a:r>
+              <a:rPr lang="de-DE" dirty="0"/>
+              <a:t>PACT File</a:t>
+            </a:r>
+          </a:p>
+        </p:txBody>
+      </p:sp>
+      <p:sp>
+        <p:nvSpPr>
+          <p:cNvPr id="10" name="Rechteck: abgerundete Ecken 9">
+            <a:extLst>
+              <a:ext uri="{FF2B5EF4-FFF2-40B4-BE49-F238E27FC236}">
+                <a16:creationId xmlns:a16="http://schemas.microsoft.com/office/drawing/2014/main" id="{6948B141-B1BC-4943-BFF5-BCA84486CC30}"/>
+              </a:ext>
+            </a:extLst>
+          </p:cNvPr>
+          <p:cNvSpPr/>
+          <p:nvPr/>
+        </p:nvSpPr>
+        <p:spPr>
+          <a:xfrm>
+            <a:off x="7355543" y="2151527"/>
+            <a:ext cx="2003610" cy="3072655"/>
+          </a:xfrm>
+          <a:prstGeom prst="roundRect">
+            <a:avLst/>
+          </a:prstGeom>
+        </p:spPr>
+        <p:style>
+          <a:lnRef idx="2">
+            <a:schemeClr val="accent2">
+              <a:shade val="50000"/>
+            </a:schemeClr>
+          </a:lnRef>
+          <a:fillRef idx="1">
+            <a:schemeClr val="accent2"/>
+          </a:fillRef>
+          <a:effectRef idx="0">
+            <a:schemeClr val="accent2"/>
+          </a:effectRef>
+          <a:fontRef idx="minor">
+            <a:schemeClr val="lt1"/>
+          </a:fontRef>
+        </p:style>
+        <p:txBody>
+          <a:bodyPr rtlCol="0" anchor="b" anchorCtr="0"/>
+          <a:lstStyle/>
+          <a:p>
+            <a:pPr algn="ctr"/>
+            <a:r>
+              <a:rPr lang="de-DE" dirty="0"/>
+              <a:t>Interaction</a:t>
+            </a:r>
+          </a:p>
+        </p:txBody>
+      </p:sp>
+      <p:sp>
+        <p:nvSpPr>
+          <p:cNvPr id="15" name="Rechteck: abgerundete Ecken 14">
+            <a:extLst>
+              <a:ext uri="{FF2B5EF4-FFF2-40B4-BE49-F238E27FC236}">
+                <a16:creationId xmlns:a16="http://schemas.microsoft.com/office/drawing/2014/main" id="{9F1BF5DC-D83D-46AC-AB86-BC3E2F954775}"/>
+              </a:ext>
+            </a:extLst>
+          </p:cNvPr>
+          <p:cNvSpPr/>
+          <p:nvPr/>
+        </p:nvSpPr>
+        <p:spPr>
+          <a:xfrm>
+            <a:off x="7451913" y="3106335"/>
+            <a:ext cx="1824680" cy="585329"/>
+          </a:xfrm>
+          <a:prstGeom prst="roundRect">
+            <a:avLst/>
+          </a:prstGeom>
+        </p:spPr>
+        <p:style>
+          <a:lnRef idx="2">
+            <a:schemeClr val="accent4">
+              <a:shade val="50000"/>
+            </a:schemeClr>
+          </a:lnRef>
+          <a:fillRef idx="1">
+            <a:schemeClr val="accent4"/>
+          </a:fillRef>
+          <a:effectRef idx="0">
+            <a:schemeClr val="accent4"/>
+          </a:effectRef>
+          <a:fontRef idx="minor">
+            <a:schemeClr val="lt1"/>
+          </a:fontRef>
+        </p:style>
+        <p:txBody>
+          <a:bodyPr rtlCol="0" anchor="ctr"/>
+          <a:lstStyle/>
+          <a:p>
+            <a:pPr algn="ctr"/>
+            <a:r>
+              <a:rPr lang="de-DE" dirty="0" err="1"/>
+              <a:t>Expected</a:t>
+            </a:r>
+            <a:r>
+              <a:rPr lang="de-DE" dirty="0"/>
+              <a:t> Request</a:t>
+            </a:r>
+          </a:p>
+        </p:txBody>
+      </p:sp>
+      <p:sp>
+        <p:nvSpPr>
+          <p:cNvPr id="16" name="Rechteck: abgerundete Ecken 15">
+            <a:extLst>
+              <a:ext uri="{FF2B5EF4-FFF2-40B4-BE49-F238E27FC236}">
+                <a16:creationId xmlns:a16="http://schemas.microsoft.com/office/drawing/2014/main" id="{9039036C-F520-41D2-AA5C-A239AE54957E}"/>
+              </a:ext>
+            </a:extLst>
+          </p:cNvPr>
+          <p:cNvSpPr/>
+          <p:nvPr/>
+        </p:nvSpPr>
+        <p:spPr>
+          <a:xfrm>
+            <a:off x="7451913" y="3826601"/>
+            <a:ext cx="1824680" cy="794857"/>
+          </a:xfrm>
+          <a:prstGeom prst="roundRect">
+            <a:avLst/>
+          </a:prstGeom>
+        </p:spPr>
+        <p:style>
+          <a:lnRef idx="2">
+            <a:schemeClr val="accent4">
+              <a:shade val="50000"/>
+            </a:schemeClr>
+          </a:lnRef>
+          <a:fillRef idx="1">
+            <a:schemeClr val="accent4"/>
+          </a:fillRef>
+          <a:effectRef idx="0">
+            <a:schemeClr val="accent4"/>
+          </a:effectRef>
+          <a:fontRef idx="minor">
+            <a:schemeClr val="lt1"/>
+          </a:fontRef>
+        </p:style>
+        <p:txBody>
+          <a:bodyPr rtlCol="0" anchor="ctr"/>
+          <a:lstStyle/>
+          <a:p>
+            <a:pPr algn="ctr"/>
+            <a:r>
+              <a:rPr lang="de-DE" dirty="0" err="1"/>
+              <a:t>Expected</a:t>
+            </a:r>
+            <a:endParaRPr lang="de-DE" dirty="0"/>
+          </a:p>
+          <a:p>
+            <a:pPr algn="ctr"/>
+            <a:r>
+              <a:rPr lang="de-DE" dirty="0"/>
+              <a:t>Minimal Response</a:t>
+            </a:r>
+          </a:p>
+        </p:txBody>
+      </p:sp>
+      <p:sp>
+        <p:nvSpPr>
+          <p:cNvPr id="17" name="Rechteck: abgerundete Ecken 16">
+            <a:extLst>
+              <a:ext uri="{FF2B5EF4-FFF2-40B4-BE49-F238E27FC236}">
+                <a16:creationId xmlns:a16="http://schemas.microsoft.com/office/drawing/2014/main" id="{1FD0F64E-0645-4958-9398-66F166009B34}"/>
+              </a:ext>
+            </a:extLst>
+          </p:cNvPr>
+          <p:cNvSpPr/>
+          <p:nvPr/>
+        </p:nvSpPr>
+        <p:spPr>
+          <a:xfrm>
+            <a:off x="7451913" y="2386069"/>
+            <a:ext cx="1824680" cy="585329"/>
+          </a:xfrm>
+          <a:prstGeom prst="roundRect">
+            <a:avLst/>
+          </a:prstGeom>
+        </p:spPr>
+        <p:style>
+          <a:lnRef idx="2">
+            <a:schemeClr val="accent3">
+              <a:shade val="50000"/>
+            </a:schemeClr>
+          </a:lnRef>
+          <a:fillRef idx="1">
+            <a:schemeClr val="accent3"/>
+          </a:fillRef>
+          <a:effectRef idx="0">
+            <a:schemeClr val="accent3"/>
+          </a:effectRef>
+          <a:fontRef idx="minor">
+            <a:schemeClr val="lt1"/>
+          </a:fontRef>
+        </p:style>
+        <p:txBody>
+          <a:bodyPr rtlCol="0" anchor="ctr"/>
+          <a:lstStyle/>
+          <a:p>
+            <a:pPr algn="ctr"/>
+            <a:r>
+              <a:rPr lang="de-DE" dirty="0"/>
+              <a:t>Provider State</a:t>
+            </a:r>
+          </a:p>
+          <a:p>
+            <a:pPr algn="ctr"/>
+            <a:r>
+              <a:rPr lang="de-DE" dirty="0"/>
+              <a:t>(optional)</a:t>
+            </a:r>
+          </a:p>
+        </p:txBody>
+      </p:sp>
+      <p:sp>
+        <p:nvSpPr>
+          <p:cNvPr id="22" name="Rechteck: abgerundete Ecken 21">
+            <a:extLst>
+              <a:ext uri="{FF2B5EF4-FFF2-40B4-BE49-F238E27FC236}">
+                <a16:creationId xmlns:a16="http://schemas.microsoft.com/office/drawing/2014/main" id="{EBF35F8C-EB20-41B0-A326-86F535C0B07F}"/>
+              </a:ext>
+            </a:extLst>
+          </p:cNvPr>
+          <p:cNvSpPr/>
+          <p:nvPr/>
+        </p:nvSpPr>
+        <p:spPr>
+          <a:xfrm>
+            <a:off x="7884461" y="2386069"/>
+            <a:ext cx="2003610" cy="3072655"/>
+          </a:xfrm>
+          <a:prstGeom prst="roundRect">
+            <a:avLst/>
+          </a:prstGeom>
+        </p:spPr>
+        <p:style>
+          <a:lnRef idx="2">
+            <a:schemeClr val="accent2">
+              <a:shade val="50000"/>
+            </a:schemeClr>
+          </a:lnRef>
+          <a:fillRef idx="1">
+            <a:schemeClr val="accent2"/>
+          </a:fillRef>
+          <a:effectRef idx="0">
+            <a:schemeClr val="accent2"/>
+          </a:effectRef>
+          <a:fontRef idx="minor">
+            <a:schemeClr val="lt1"/>
+          </a:fontRef>
+        </p:style>
+        <p:txBody>
+          <a:bodyPr rtlCol="0" anchor="b" anchorCtr="0"/>
+          <a:lstStyle/>
+          <a:p>
+            <a:pPr algn="ctr"/>
+            <a:r>
+              <a:rPr lang="de-DE" dirty="0"/>
+              <a:t>Interaction</a:t>
+            </a:r>
+          </a:p>
+        </p:txBody>
+      </p:sp>
+      <p:sp>
+        <p:nvSpPr>
+          <p:cNvPr id="23" name="Rechteck: abgerundete Ecken 22">
+            <a:extLst>
+              <a:ext uri="{FF2B5EF4-FFF2-40B4-BE49-F238E27FC236}">
+                <a16:creationId xmlns:a16="http://schemas.microsoft.com/office/drawing/2014/main" id="{FE9BE0FB-B795-4DE7-BF92-00D84352A364}"/>
+              </a:ext>
+            </a:extLst>
+          </p:cNvPr>
+          <p:cNvSpPr/>
+          <p:nvPr/>
+        </p:nvSpPr>
+        <p:spPr>
+          <a:xfrm>
+            <a:off x="7980831" y="3340877"/>
+            <a:ext cx="1824680" cy="585329"/>
+          </a:xfrm>
+          <a:prstGeom prst="roundRect">
+            <a:avLst/>
+          </a:prstGeom>
+        </p:spPr>
+        <p:style>
+          <a:lnRef idx="2">
+            <a:schemeClr val="accent4">
+              <a:shade val="50000"/>
+            </a:schemeClr>
+          </a:lnRef>
+          <a:fillRef idx="1">
+            <a:schemeClr val="accent4"/>
+          </a:fillRef>
+          <a:effectRef idx="0">
+            <a:schemeClr val="accent4"/>
+          </a:effectRef>
+          <a:fontRef idx="minor">
+            <a:schemeClr val="lt1"/>
+          </a:fontRef>
+        </p:style>
+        <p:txBody>
+          <a:bodyPr rtlCol="0" anchor="ctr"/>
+          <a:lstStyle/>
+          <a:p>
+            <a:pPr algn="ctr"/>
+            <a:r>
+              <a:rPr lang="de-DE" dirty="0" err="1"/>
+              <a:t>Expected</a:t>
+            </a:r>
+            <a:r>
+              <a:rPr lang="de-DE" dirty="0"/>
+              <a:t> Request</a:t>
+            </a:r>
+          </a:p>
+        </p:txBody>
+      </p:sp>
+      <p:sp>
+        <p:nvSpPr>
+          <p:cNvPr id="24" name="Rechteck: abgerundete Ecken 23">
+            <a:extLst>
+              <a:ext uri="{FF2B5EF4-FFF2-40B4-BE49-F238E27FC236}">
+                <a16:creationId xmlns:a16="http://schemas.microsoft.com/office/drawing/2014/main" id="{F043A148-94CC-4B90-B8EE-1BF512F390EF}"/>
+              </a:ext>
+            </a:extLst>
+          </p:cNvPr>
+          <p:cNvSpPr/>
+          <p:nvPr/>
+        </p:nvSpPr>
+        <p:spPr>
+          <a:xfrm>
+            <a:off x="7980831" y="4061143"/>
+            <a:ext cx="1824680" cy="794857"/>
+          </a:xfrm>
+          <a:prstGeom prst="roundRect">
+            <a:avLst/>
+          </a:prstGeom>
+        </p:spPr>
+        <p:style>
+          <a:lnRef idx="2">
+            <a:schemeClr val="accent4">
+              <a:shade val="50000"/>
+            </a:schemeClr>
+          </a:lnRef>
+          <a:fillRef idx="1">
+            <a:schemeClr val="accent4"/>
+          </a:fillRef>
+          <a:effectRef idx="0">
+            <a:schemeClr val="accent4"/>
+          </a:effectRef>
+          <a:fontRef idx="minor">
+            <a:schemeClr val="lt1"/>
+          </a:fontRef>
+        </p:style>
+        <p:txBody>
+          <a:bodyPr rtlCol="0" anchor="ctr"/>
+          <a:lstStyle/>
+          <a:p>
+            <a:pPr algn="ctr"/>
+            <a:r>
+              <a:rPr lang="de-DE" dirty="0" err="1"/>
+              <a:t>Expected</a:t>
+            </a:r>
+            <a:endParaRPr lang="de-DE" dirty="0"/>
+          </a:p>
+          <a:p>
+            <a:pPr algn="ctr"/>
+            <a:r>
+              <a:rPr lang="de-DE" dirty="0"/>
+              <a:t>Minimal Response</a:t>
+            </a:r>
+          </a:p>
+        </p:txBody>
+      </p:sp>
+      <p:sp>
+        <p:nvSpPr>
+          <p:cNvPr id="25" name="Rechteck: abgerundete Ecken 24">
+            <a:extLst>
+              <a:ext uri="{FF2B5EF4-FFF2-40B4-BE49-F238E27FC236}">
+                <a16:creationId xmlns:a16="http://schemas.microsoft.com/office/drawing/2014/main" id="{FE0C0EA0-18E7-4622-8D29-789E808D4695}"/>
+              </a:ext>
+            </a:extLst>
+          </p:cNvPr>
+          <p:cNvSpPr/>
+          <p:nvPr/>
+        </p:nvSpPr>
+        <p:spPr>
+          <a:xfrm>
+            <a:off x="7980831" y="2620611"/>
+            <a:ext cx="1824680" cy="585329"/>
+          </a:xfrm>
+          <a:prstGeom prst="roundRect">
+            <a:avLst/>
+          </a:prstGeom>
+        </p:spPr>
+        <p:style>
+          <a:lnRef idx="2">
+            <a:schemeClr val="accent3">
+              <a:shade val="50000"/>
+            </a:schemeClr>
+          </a:lnRef>
+          <a:fillRef idx="1">
+            <a:schemeClr val="accent3"/>
+          </a:fillRef>
+          <a:effectRef idx="0">
+            <a:schemeClr val="accent3"/>
+          </a:effectRef>
+          <a:fontRef idx="minor">
+            <a:schemeClr val="lt1"/>
+          </a:fontRef>
+        </p:style>
+        <p:txBody>
+          <a:bodyPr rtlCol="0" anchor="ctr"/>
+          <a:lstStyle/>
+          <a:p>
+            <a:pPr algn="ctr"/>
+            <a:r>
+              <a:rPr lang="de-DE" dirty="0"/>
+              <a:t>Provider State</a:t>
+            </a:r>
+          </a:p>
+          <a:p>
+            <a:pPr algn="ctr"/>
+            <a:r>
+              <a:rPr lang="de-DE" dirty="0"/>
+              <a:t>(optional)</a:t>
+            </a:r>
+          </a:p>
+        </p:txBody>
+      </p:sp>
+      <p:sp>
+        <p:nvSpPr>
+          <p:cNvPr id="34" name="Rechteck: abgerundete Ecken 33">
+            <a:extLst>
+              <a:ext uri="{FF2B5EF4-FFF2-40B4-BE49-F238E27FC236}">
+                <a16:creationId xmlns:a16="http://schemas.microsoft.com/office/drawing/2014/main" id="{EAB32252-D643-4D29-AE2A-9968D6510222}"/>
+              </a:ext>
+            </a:extLst>
+          </p:cNvPr>
+          <p:cNvSpPr/>
+          <p:nvPr/>
+        </p:nvSpPr>
+        <p:spPr>
+          <a:xfrm>
+            <a:off x="8357348" y="2619827"/>
+            <a:ext cx="2003610" cy="3072655"/>
+          </a:xfrm>
+          <a:prstGeom prst="roundRect">
+            <a:avLst/>
+          </a:prstGeom>
+        </p:spPr>
+        <p:style>
+          <a:lnRef idx="2">
+            <a:schemeClr val="accent2">
+              <a:shade val="50000"/>
+            </a:schemeClr>
+          </a:lnRef>
+          <a:fillRef idx="1">
+            <a:schemeClr val="accent2"/>
+          </a:fillRef>
+          <a:effectRef idx="0">
+            <a:schemeClr val="accent2"/>
+          </a:effectRef>
+          <a:fontRef idx="minor">
+            <a:schemeClr val="lt1"/>
+          </a:fontRef>
+        </p:style>
+        <p:txBody>
+          <a:bodyPr rtlCol="0" anchor="b" anchorCtr="0"/>
+          <a:lstStyle/>
+          <a:p>
+            <a:pPr algn="ctr"/>
+            <a:r>
+              <a:rPr lang="de-DE" dirty="0"/>
+              <a:t>Interaction</a:t>
+            </a:r>
+          </a:p>
+        </p:txBody>
+      </p:sp>
+      <p:sp>
+        <p:nvSpPr>
+          <p:cNvPr id="35" name="Rechteck: abgerundete Ecken 34">
+            <a:extLst>
+              <a:ext uri="{FF2B5EF4-FFF2-40B4-BE49-F238E27FC236}">
+                <a16:creationId xmlns:a16="http://schemas.microsoft.com/office/drawing/2014/main" id="{65881189-ABB1-491F-849E-EE39CCA97B21}"/>
+              </a:ext>
+            </a:extLst>
+          </p:cNvPr>
+          <p:cNvSpPr/>
+          <p:nvPr/>
+        </p:nvSpPr>
+        <p:spPr>
+          <a:xfrm>
+            <a:off x="8453718" y="3574635"/>
+            <a:ext cx="1824680" cy="585329"/>
+          </a:xfrm>
+          <a:prstGeom prst="roundRect">
+            <a:avLst/>
+          </a:prstGeom>
+        </p:spPr>
+        <p:style>
+          <a:lnRef idx="2">
+            <a:schemeClr val="accent4">
+              <a:shade val="50000"/>
+            </a:schemeClr>
+          </a:lnRef>
+          <a:fillRef idx="1">
+            <a:schemeClr val="accent4"/>
+          </a:fillRef>
+          <a:effectRef idx="0">
+            <a:schemeClr val="accent4"/>
+          </a:effectRef>
+          <a:fontRef idx="minor">
+            <a:schemeClr val="lt1"/>
+          </a:fontRef>
+        </p:style>
+        <p:txBody>
+          <a:bodyPr rtlCol="0" anchor="ctr"/>
+          <a:lstStyle/>
+          <a:p>
+            <a:pPr algn="ctr"/>
+            <a:r>
+              <a:rPr lang="de-DE" dirty="0" err="1"/>
+              <a:t>Expected</a:t>
+            </a:r>
+            <a:r>
+              <a:rPr lang="de-DE" dirty="0"/>
+              <a:t> Request</a:t>
+            </a:r>
+          </a:p>
+        </p:txBody>
+      </p:sp>
+      <p:sp>
+        <p:nvSpPr>
+          <p:cNvPr id="36" name="Rechteck: abgerundete Ecken 35">
+            <a:extLst>
+              <a:ext uri="{FF2B5EF4-FFF2-40B4-BE49-F238E27FC236}">
+                <a16:creationId xmlns:a16="http://schemas.microsoft.com/office/drawing/2014/main" id="{04EBDE84-0B8F-42B0-8EEC-3099CC28CBAA}"/>
+              </a:ext>
+            </a:extLst>
+          </p:cNvPr>
+          <p:cNvSpPr/>
+          <p:nvPr/>
+        </p:nvSpPr>
+        <p:spPr>
+          <a:xfrm>
+            <a:off x="8453718" y="4294901"/>
+            <a:ext cx="1824680" cy="794857"/>
+          </a:xfrm>
+          <a:prstGeom prst="roundRect">
+            <a:avLst/>
+          </a:prstGeom>
+        </p:spPr>
+        <p:style>
+          <a:lnRef idx="2">
+            <a:schemeClr val="accent4">
+              <a:shade val="50000"/>
+            </a:schemeClr>
+          </a:lnRef>
+          <a:fillRef idx="1">
+            <a:schemeClr val="accent4"/>
+          </a:fillRef>
+          <a:effectRef idx="0">
+            <a:schemeClr val="accent4"/>
+          </a:effectRef>
+          <a:fontRef idx="minor">
+            <a:schemeClr val="lt1"/>
+          </a:fontRef>
+        </p:style>
+        <p:txBody>
+          <a:bodyPr rtlCol="0" anchor="ctr"/>
+          <a:lstStyle/>
+          <a:p>
+            <a:pPr algn="ctr"/>
+            <a:r>
+              <a:rPr lang="de-DE" dirty="0" err="1"/>
+              <a:t>Expected</a:t>
+            </a:r>
+            <a:endParaRPr lang="de-DE" dirty="0"/>
+          </a:p>
+          <a:p>
+            <a:pPr algn="ctr"/>
+            <a:r>
+              <a:rPr lang="de-DE" dirty="0"/>
+              <a:t>Minimal Response</a:t>
+            </a:r>
+          </a:p>
+        </p:txBody>
+      </p:sp>
+      <p:sp>
+        <p:nvSpPr>
+          <p:cNvPr id="37" name="Rechteck: abgerundete Ecken 36">
+            <a:extLst>
+              <a:ext uri="{FF2B5EF4-FFF2-40B4-BE49-F238E27FC236}">
+                <a16:creationId xmlns:a16="http://schemas.microsoft.com/office/drawing/2014/main" id="{3586A200-5018-413A-B033-EE3E87AC7420}"/>
+              </a:ext>
+            </a:extLst>
+          </p:cNvPr>
+          <p:cNvSpPr/>
+          <p:nvPr/>
+        </p:nvSpPr>
+        <p:spPr>
+          <a:xfrm>
+            <a:off x="8453718" y="2854369"/>
+            <a:ext cx="1824680" cy="585329"/>
+          </a:xfrm>
+          <a:prstGeom prst="roundRect">
+            <a:avLst/>
+          </a:prstGeom>
+        </p:spPr>
+        <p:style>
+          <a:lnRef idx="2">
+            <a:schemeClr val="accent3">
+              <a:shade val="50000"/>
+            </a:schemeClr>
+          </a:lnRef>
+          <a:fillRef idx="1">
+            <a:schemeClr val="accent3"/>
+          </a:fillRef>
+          <a:effectRef idx="0">
+            <a:schemeClr val="accent3"/>
+          </a:effectRef>
+          <a:fontRef idx="minor">
+            <a:schemeClr val="lt1"/>
+          </a:fontRef>
+        </p:style>
+        <p:txBody>
+          <a:bodyPr rtlCol="0" anchor="ctr"/>
+          <a:lstStyle/>
+          <a:p>
+            <a:pPr algn="ctr"/>
+            <a:r>
+              <a:rPr lang="de-DE" dirty="0"/>
+              <a:t>Provider State</a:t>
+            </a:r>
+          </a:p>
+          <a:p>
+            <a:pPr algn="ctr"/>
+            <a:r>
+              <a:rPr lang="de-DE" dirty="0"/>
+              <a:t>(optional)</a:t>
+            </a:r>
+          </a:p>
+        </p:txBody>
+      </p:sp>
+    </p:spTree>
+    <p:extLst>
+      <p:ext uri="{BB962C8B-B14F-4D97-AF65-F5344CB8AC3E}">
+        <p14:creationId xmlns:p14="http://schemas.microsoft.com/office/powerpoint/2010/main" val="3559829259"/>
+      </p:ext>
+    </p:extLst>
+  </p:cSld>
+  <p:clrMapOvr>
+    <a:masterClrMapping/>
+  </p:clrMapOvr>
+</p:sld>
+</file>
+
+<file path=ppt/slides/slide17.xml><?xml version="1.0" encoding="utf-8"?>
+<p:sld xmlns:a="http://schemas.openxmlformats.org/drawingml/2006/main" xmlns:r="http://schemas.openxmlformats.org/officeDocument/2006/relationships" xmlns:p="http://schemas.openxmlformats.org/presentationml/2006/main">
+  <p:cSld>
+    <p:spTree>
+      <p:nvGrpSpPr>
+        <p:cNvPr id="1" name=""/>
+        <p:cNvGrpSpPr/>
+        <p:nvPr/>
+      </p:nvGrpSpPr>
+      <p:grpSpPr>
+        <a:xfrm>
+          <a:off x="0" y="0"/>
+          <a:ext cx="0" cy="0"/>
+          <a:chOff x="0" y="0"/>
+          <a:chExt cx="0" cy="0"/>
+        </a:xfrm>
+      </p:grpSpPr>
+      <p:sp>
+        <p:nvSpPr>
+          <p:cNvPr id="2" name="Titel 1">
+            <a:extLst>
+              <a:ext uri="{FF2B5EF4-FFF2-40B4-BE49-F238E27FC236}">
+                <a16:creationId xmlns:a16="http://schemas.microsoft.com/office/drawing/2014/main" id="{C734F834-D5A5-4DC9-AEC6-A66BDCCA32A6}"/>
+              </a:ext>
+            </a:extLst>
+          </p:cNvPr>
+          <p:cNvSpPr>
+            <a:spLocks noGrp="1"/>
+          </p:cNvSpPr>
+          <p:nvPr>
+            <p:ph type="title"/>
+          </p:nvPr>
+        </p:nvSpPr>
+        <p:spPr/>
+        <p:txBody>
+          <a:bodyPr/>
+          <a:lstStyle/>
+          <a:p>
+            <a:r>
+              <a:rPr lang="de-DE" dirty="0"/>
+              <a:t>Consumer Tests</a:t>
+            </a:r>
+          </a:p>
+        </p:txBody>
+      </p:sp>
+      <p:sp>
+        <p:nvSpPr>
+          <p:cNvPr id="3" name="Inhaltsplatzhalter 2">
+            <a:extLst>
+              <a:ext uri="{FF2B5EF4-FFF2-40B4-BE49-F238E27FC236}">
+                <a16:creationId xmlns:a16="http://schemas.microsoft.com/office/drawing/2014/main" id="{F5210324-BC78-4DEF-B95E-78C14CCB04E6}"/>
+              </a:ext>
+            </a:extLst>
+          </p:cNvPr>
+          <p:cNvSpPr>
+            <a:spLocks noGrp="1"/>
+          </p:cNvSpPr>
+          <p:nvPr>
+            <p:ph sz="half" idx="1"/>
+          </p:nvPr>
+        </p:nvSpPr>
+        <p:spPr/>
+        <p:txBody>
+          <a:bodyPr/>
+          <a:lstStyle/>
+          <a:p>
+            <a:endParaRPr lang="de-DE"/>
+          </a:p>
+        </p:txBody>
+      </p:sp>
+      <p:sp>
+        <p:nvSpPr>
+          <p:cNvPr id="4" name="Inhaltsplatzhalter 3">
+            <a:extLst>
+              <a:ext uri="{FF2B5EF4-FFF2-40B4-BE49-F238E27FC236}">
+                <a16:creationId xmlns:a16="http://schemas.microsoft.com/office/drawing/2014/main" id="{A205CE5C-33F2-4473-BC18-1AFFD1CA6491}"/>
+              </a:ext>
+            </a:extLst>
+          </p:cNvPr>
+          <p:cNvSpPr>
+            <a:spLocks noGrp="1"/>
+          </p:cNvSpPr>
+          <p:nvPr>
+            <p:ph sz="half" idx="2"/>
+          </p:nvPr>
+        </p:nvSpPr>
+        <p:spPr/>
+        <p:txBody>
+          <a:bodyPr/>
+          <a:lstStyle/>
+          <a:p>
+            <a:endParaRPr lang="de-DE"/>
+          </a:p>
+        </p:txBody>
+      </p:sp>
+    </p:spTree>
+    <p:extLst>
+      <p:ext uri="{BB962C8B-B14F-4D97-AF65-F5344CB8AC3E}">
+        <p14:creationId xmlns:p14="http://schemas.microsoft.com/office/powerpoint/2010/main" val="2289293521"/>
+      </p:ext>
+    </p:extLst>
+  </p:cSld>
+  <p:clrMapOvr>
+    <a:masterClrMapping/>
+  </p:clrMapOvr>
+</p:sld>
+</file>
+
+<file path=ppt/slides/slide18.xml><?xml version="1.0" encoding="utf-8"?>
+<p:sld xmlns:a="http://schemas.openxmlformats.org/drawingml/2006/main" xmlns:r="http://schemas.openxmlformats.org/officeDocument/2006/relationships" xmlns:p="http://schemas.openxmlformats.org/presentationml/2006/main">
+  <p:cSld>
+    <p:spTree>
+      <p:nvGrpSpPr>
+        <p:cNvPr id="1" name=""/>
+        <p:cNvGrpSpPr/>
+        <p:nvPr/>
+      </p:nvGrpSpPr>
+      <p:grpSpPr>
+        <a:xfrm>
+          <a:off x="0" y="0"/>
+          <a:ext cx="0" cy="0"/>
+          <a:chOff x="0" y="0"/>
+          <a:chExt cx="0" cy="0"/>
+        </a:xfrm>
+      </p:grpSpPr>
+      <p:sp>
+        <p:nvSpPr>
+          <p:cNvPr id="5" name="Titel 4">
+            <a:extLst>
+              <a:ext uri="{FF2B5EF4-FFF2-40B4-BE49-F238E27FC236}">
+                <a16:creationId xmlns:a16="http://schemas.microsoft.com/office/drawing/2014/main" id="{A199AABF-42CA-48C1-866C-901A6A736337}"/>
+              </a:ext>
+            </a:extLst>
+          </p:cNvPr>
+          <p:cNvSpPr>
+            <a:spLocks noGrp="1"/>
+          </p:cNvSpPr>
+          <p:nvPr>
+            <p:ph type="title"/>
+          </p:nvPr>
+        </p:nvSpPr>
+        <p:spPr/>
+        <p:txBody>
+          <a:bodyPr/>
+          <a:lstStyle/>
+          <a:p>
+            <a:r>
+              <a:rPr lang="de-DE" dirty="0"/>
+              <a:t>Demo</a:t>
+            </a:r>
+          </a:p>
+        </p:txBody>
+      </p:sp>
+      <p:sp>
+        <p:nvSpPr>
+          <p:cNvPr id="6" name="Textplatzhalter 5">
+            <a:extLst>
+              <a:ext uri="{FF2B5EF4-FFF2-40B4-BE49-F238E27FC236}">
+                <a16:creationId xmlns:a16="http://schemas.microsoft.com/office/drawing/2014/main" id="{D0F1FC17-1F5F-4006-9E7D-A3C1E627161A}"/>
+              </a:ext>
+            </a:extLst>
+          </p:cNvPr>
+          <p:cNvSpPr>
+            <a:spLocks noGrp="1"/>
+          </p:cNvSpPr>
+          <p:nvPr>
+            <p:ph type="body" idx="1"/>
+          </p:nvPr>
+        </p:nvSpPr>
+        <p:spPr/>
+        <p:txBody>
+          <a:bodyPr/>
+          <a:lstStyle/>
+          <a:p>
+            <a:r>
+              <a:rPr lang="de-DE" dirty="0" err="1"/>
+              <a:t>Creating</a:t>
+            </a:r>
+            <a:r>
+              <a:rPr lang="de-DE" dirty="0"/>
+              <a:t> Consumer Tests</a:t>
+            </a:r>
+          </a:p>
+        </p:txBody>
+      </p:sp>
+    </p:spTree>
+    <p:extLst>
+      <p:ext uri="{BB962C8B-B14F-4D97-AF65-F5344CB8AC3E}">
+        <p14:creationId xmlns:p14="http://schemas.microsoft.com/office/powerpoint/2010/main" val="1954178484"/>
+      </p:ext>
+    </p:extLst>
+  </p:cSld>
+  <p:clrMapOvr>
+    <a:masterClrMapping/>
+  </p:clrMapOvr>
+</p:sld>
+</file>
+
+<file path=ppt/slides/slide19.xml><?xml version="1.0" encoding="utf-8"?>
+<p:sld xmlns:a="http://schemas.openxmlformats.org/drawingml/2006/main" xmlns:r="http://schemas.openxmlformats.org/officeDocument/2006/relationships" xmlns:p="http://schemas.openxmlformats.org/presentationml/2006/main">
+  <p:cSld>
+    <p:spTree>
+      <p:nvGrpSpPr>
+        <p:cNvPr id="1" name=""/>
+        <p:cNvGrpSpPr/>
+        <p:nvPr/>
+      </p:nvGrpSpPr>
+      <p:grpSpPr>
+        <a:xfrm>
+          <a:off x="0" y="0"/>
+          <a:ext cx="0" cy="0"/>
+          <a:chOff x="0" y="0"/>
+          <a:chExt cx="0" cy="0"/>
+        </a:xfrm>
+      </p:grpSpPr>
+      <p:sp>
+        <p:nvSpPr>
+          <p:cNvPr id="2" name="Titel 1">
+            <a:extLst>
+              <a:ext uri="{FF2B5EF4-FFF2-40B4-BE49-F238E27FC236}">
+                <a16:creationId xmlns:a16="http://schemas.microsoft.com/office/drawing/2014/main" id="{F6D8A003-AE88-4890-A11B-649504A50008}"/>
+              </a:ext>
+            </a:extLst>
+          </p:cNvPr>
+          <p:cNvSpPr>
+            <a:spLocks noGrp="1"/>
+          </p:cNvSpPr>
+          <p:nvPr>
+            <p:ph type="title"/>
+          </p:nvPr>
+        </p:nvSpPr>
+        <p:spPr/>
+        <p:txBody>
+          <a:bodyPr/>
+          <a:lstStyle/>
+          <a:p>
+            <a:r>
+              <a:rPr lang="de-DE" dirty="0"/>
+              <a:t>Demo</a:t>
+            </a:r>
+          </a:p>
+        </p:txBody>
+      </p:sp>
+      <p:sp>
+        <p:nvSpPr>
+          <p:cNvPr id="3" name="Textplatzhalter 2">
+            <a:extLst>
+              <a:ext uri="{FF2B5EF4-FFF2-40B4-BE49-F238E27FC236}">
+                <a16:creationId xmlns:a16="http://schemas.microsoft.com/office/drawing/2014/main" id="{A923AF01-4379-480E-A8C5-83D4A0720EFA}"/>
+              </a:ext>
+            </a:extLst>
+          </p:cNvPr>
+          <p:cNvSpPr>
+            <a:spLocks noGrp="1"/>
+          </p:cNvSpPr>
+          <p:nvPr>
+            <p:ph type="body" idx="1"/>
+          </p:nvPr>
+        </p:nvSpPr>
+        <p:spPr/>
+        <p:txBody>
+          <a:bodyPr/>
+          <a:lstStyle/>
+          <a:p>
+            <a:r>
+              <a:rPr lang="de-DE" dirty="0" err="1"/>
+              <a:t>Creating</a:t>
+            </a:r>
+            <a:r>
+              <a:rPr lang="de-DE" dirty="0"/>
+              <a:t> Provider Tests</a:t>
+            </a:r>
+          </a:p>
+        </p:txBody>
+      </p:sp>
+    </p:spTree>
+    <p:extLst>
+      <p:ext uri="{BB962C8B-B14F-4D97-AF65-F5344CB8AC3E}">
+        <p14:creationId xmlns:p14="http://schemas.microsoft.com/office/powerpoint/2010/main" val="1434751405"/>
       </p:ext>
     </p:extLst>
   </p:cSld>
@@ -18725,6 +20390,675 @@
     <p:extLst>
       <p:ext uri="{BB962C8B-B14F-4D97-AF65-F5344CB8AC3E}">
         <p14:creationId xmlns:p14="http://schemas.microsoft.com/office/powerpoint/2010/main" val="1387228931"/>
+      </p:ext>
+    </p:extLst>
+  </p:cSld>
+  <p:clrMapOvr>
+    <a:masterClrMapping/>
+  </p:clrMapOvr>
+</p:sld>
+</file>
+
+<file path=ppt/slides/slide20.xml><?xml version="1.0" encoding="utf-8"?>
+<p:sld xmlns:a="http://schemas.openxmlformats.org/drawingml/2006/main" xmlns:r="http://schemas.openxmlformats.org/officeDocument/2006/relationships" xmlns:p="http://schemas.openxmlformats.org/presentationml/2006/main">
+  <p:cSld>
+    <p:spTree>
+      <p:nvGrpSpPr>
+        <p:cNvPr id="1" name=""/>
+        <p:cNvGrpSpPr/>
+        <p:nvPr/>
+      </p:nvGrpSpPr>
+      <p:grpSpPr>
+        <a:xfrm>
+          <a:off x="0" y="0"/>
+          <a:ext cx="0" cy="0"/>
+          <a:chOff x="0" y="0"/>
+          <a:chExt cx="0" cy="0"/>
+        </a:xfrm>
+      </p:grpSpPr>
+      <p:sp>
+        <p:nvSpPr>
+          <p:cNvPr id="4" name="Titel 3">
+            <a:extLst>
+              <a:ext uri="{FF2B5EF4-FFF2-40B4-BE49-F238E27FC236}">
+                <a16:creationId xmlns:a16="http://schemas.microsoft.com/office/drawing/2014/main" id="{2F9EC6CB-6E85-4A70-B384-DD26345D3AB7}"/>
+              </a:ext>
+            </a:extLst>
+          </p:cNvPr>
+          <p:cNvSpPr>
+            <a:spLocks noGrp="1"/>
+          </p:cNvSpPr>
+          <p:nvPr>
+            <p:ph type="title"/>
+          </p:nvPr>
+        </p:nvSpPr>
+        <p:spPr/>
+        <p:txBody>
+          <a:bodyPr/>
+          <a:lstStyle/>
+          <a:p>
+            <a:r>
+              <a:rPr lang="de-DE" dirty="0"/>
+              <a:t>Supported </a:t>
+            </a:r>
+            <a:r>
+              <a:rPr lang="de-DE" dirty="0" err="1"/>
+              <a:t>languages</a:t>
+            </a:r>
+            <a:endParaRPr lang="de-DE" dirty="0"/>
+          </a:p>
+        </p:txBody>
+      </p:sp>
+      <p:sp>
+        <p:nvSpPr>
+          <p:cNvPr id="5" name="Inhaltsplatzhalter 4">
+            <a:extLst>
+              <a:ext uri="{FF2B5EF4-FFF2-40B4-BE49-F238E27FC236}">
+                <a16:creationId xmlns:a16="http://schemas.microsoft.com/office/drawing/2014/main" id="{01545CEF-F65F-41CA-884B-7AF3E7097EB9}"/>
+              </a:ext>
+            </a:extLst>
+          </p:cNvPr>
+          <p:cNvSpPr>
+            <a:spLocks noGrp="1"/>
+          </p:cNvSpPr>
+          <p:nvPr>
+            <p:ph idx="1"/>
+          </p:nvPr>
+        </p:nvSpPr>
+        <p:spPr/>
+        <p:txBody>
+          <a:bodyPr/>
+          <a:lstStyle/>
+          <a:p>
+            <a:endParaRPr lang="de-DE" dirty="0"/>
+          </a:p>
+        </p:txBody>
+      </p:sp>
+    </p:spTree>
+    <p:extLst>
+      <p:ext uri="{BB962C8B-B14F-4D97-AF65-F5344CB8AC3E}">
+        <p14:creationId xmlns:p14="http://schemas.microsoft.com/office/powerpoint/2010/main" val="692880108"/>
+      </p:ext>
+    </p:extLst>
+  </p:cSld>
+  <p:clrMapOvr>
+    <a:masterClrMapping/>
+  </p:clrMapOvr>
+</p:sld>
+</file>
+
+<file path=ppt/slides/slide21.xml><?xml version="1.0" encoding="utf-8"?>
+<p:sld xmlns:a="http://schemas.openxmlformats.org/drawingml/2006/main" xmlns:r="http://schemas.openxmlformats.org/officeDocument/2006/relationships" xmlns:p="http://schemas.openxmlformats.org/presentationml/2006/main">
+  <p:cSld>
+    <p:spTree>
+      <p:nvGrpSpPr>
+        <p:cNvPr id="1" name=""/>
+        <p:cNvGrpSpPr/>
+        <p:nvPr/>
+      </p:nvGrpSpPr>
+      <p:grpSpPr>
+        <a:xfrm>
+          <a:off x="0" y="0"/>
+          <a:ext cx="0" cy="0"/>
+          <a:chOff x="0" y="0"/>
+          <a:chExt cx="0" cy="0"/>
+        </a:xfrm>
+      </p:grpSpPr>
+      <p:sp>
+        <p:nvSpPr>
+          <p:cNvPr id="2" name="Titel 1">
+            <a:extLst>
+              <a:ext uri="{FF2B5EF4-FFF2-40B4-BE49-F238E27FC236}">
+                <a16:creationId xmlns:a16="http://schemas.microsoft.com/office/drawing/2014/main" id="{C0EB144C-C0AF-4681-85E5-C4B916854102}"/>
+              </a:ext>
+            </a:extLst>
+          </p:cNvPr>
+          <p:cNvSpPr>
+            <a:spLocks noGrp="1"/>
+          </p:cNvSpPr>
+          <p:nvPr>
+            <p:ph type="title"/>
+          </p:nvPr>
+        </p:nvSpPr>
+        <p:spPr/>
+        <p:txBody>
+          <a:bodyPr/>
+          <a:lstStyle/>
+          <a:p>
+            <a:r>
+              <a:rPr lang="de-DE" dirty="0"/>
+              <a:t>Demo</a:t>
+            </a:r>
+          </a:p>
+        </p:txBody>
+      </p:sp>
+      <p:sp>
+        <p:nvSpPr>
+          <p:cNvPr id="3" name="Textplatzhalter 2">
+            <a:extLst>
+              <a:ext uri="{FF2B5EF4-FFF2-40B4-BE49-F238E27FC236}">
+                <a16:creationId xmlns:a16="http://schemas.microsoft.com/office/drawing/2014/main" id="{6AC6F36F-F1BA-447D-9B13-1053D0BC6E1C}"/>
+              </a:ext>
+            </a:extLst>
+          </p:cNvPr>
+          <p:cNvSpPr>
+            <a:spLocks noGrp="1"/>
+          </p:cNvSpPr>
+          <p:nvPr>
+            <p:ph type="body" idx="1"/>
+          </p:nvPr>
+        </p:nvSpPr>
+        <p:spPr/>
+        <p:txBody>
+          <a:bodyPr/>
+          <a:lstStyle/>
+          <a:p>
+            <a:r>
+              <a:rPr lang="de-DE" dirty="0" err="1"/>
+              <a:t>Creating</a:t>
+            </a:r>
+            <a:r>
+              <a:rPr lang="de-DE" dirty="0"/>
+              <a:t> Consumer Tests </a:t>
+            </a:r>
+            <a:r>
+              <a:rPr lang="de-DE" dirty="0" err="1"/>
+              <a:t>for</a:t>
+            </a:r>
+            <a:r>
+              <a:rPr lang="de-DE" dirty="0"/>
+              <a:t> Web Client</a:t>
+            </a:r>
+          </a:p>
+        </p:txBody>
+      </p:sp>
+    </p:spTree>
+    <p:extLst>
+      <p:ext uri="{BB962C8B-B14F-4D97-AF65-F5344CB8AC3E}">
+        <p14:creationId xmlns:p14="http://schemas.microsoft.com/office/powerpoint/2010/main" val="3847536293"/>
+      </p:ext>
+    </p:extLst>
+  </p:cSld>
+  <p:clrMapOvr>
+    <a:masterClrMapping/>
+  </p:clrMapOvr>
+</p:sld>
+</file>
+
+<file path=ppt/slides/slide22.xml><?xml version="1.0" encoding="utf-8"?>
+<p:sld xmlns:a="http://schemas.openxmlformats.org/drawingml/2006/main" xmlns:r="http://schemas.openxmlformats.org/officeDocument/2006/relationships" xmlns:p="http://schemas.openxmlformats.org/presentationml/2006/main">
+  <p:cSld>
+    <p:spTree>
+      <p:nvGrpSpPr>
+        <p:cNvPr id="1" name=""/>
+        <p:cNvGrpSpPr/>
+        <p:nvPr/>
+      </p:nvGrpSpPr>
+      <p:grpSpPr>
+        <a:xfrm>
+          <a:off x="0" y="0"/>
+          <a:ext cx="0" cy="0"/>
+          <a:chOff x="0" y="0"/>
+          <a:chExt cx="0" cy="0"/>
+        </a:xfrm>
+      </p:grpSpPr>
+      <p:sp>
+        <p:nvSpPr>
+          <p:cNvPr id="4" name="Titel 3">
+            <a:extLst>
+              <a:ext uri="{FF2B5EF4-FFF2-40B4-BE49-F238E27FC236}">
+                <a16:creationId xmlns:a16="http://schemas.microsoft.com/office/drawing/2014/main" id="{65F8A420-7F7A-4973-A6D8-DD8E496319C6}"/>
+              </a:ext>
+            </a:extLst>
+          </p:cNvPr>
+          <p:cNvSpPr>
+            <a:spLocks noGrp="1"/>
+          </p:cNvSpPr>
+          <p:nvPr>
+            <p:ph type="title"/>
+          </p:nvPr>
+        </p:nvSpPr>
+        <p:spPr/>
+        <p:txBody>
+          <a:bodyPr/>
+          <a:lstStyle/>
+          <a:p>
+            <a:r>
+              <a:rPr lang="de-DE" dirty="0"/>
+              <a:t>PACT Broker</a:t>
+            </a:r>
+          </a:p>
+        </p:txBody>
+      </p:sp>
+      <p:sp>
+        <p:nvSpPr>
+          <p:cNvPr id="5" name="Inhaltsplatzhalter 4">
+            <a:extLst>
+              <a:ext uri="{FF2B5EF4-FFF2-40B4-BE49-F238E27FC236}">
+                <a16:creationId xmlns:a16="http://schemas.microsoft.com/office/drawing/2014/main" id="{F7D7AC5B-A7F4-447D-9253-D3DF94667D95}"/>
+              </a:ext>
+            </a:extLst>
+          </p:cNvPr>
+          <p:cNvSpPr>
+            <a:spLocks noGrp="1"/>
+          </p:cNvSpPr>
+          <p:nvPr>
+            <p:ph idx="1"/>
+          </p:nvPr>
+        </p:nvSpPr>
+        <p:spPr/>
+        <p:txBody>
+          <a:bodyPr/>
+          <a:lstStyle/>
+          <a:p>
+            <a:endParaRPr lang="de-DE" dirty="0"/>
+          </a:p>
+        </p:txBody>
+      </p:sp>
+    </p:spTree>
+    <p:extLst>
+      <p:ext uri="{BB962C8B-B14F-4D97-AF65-F5344CB8AC3E}">
+        <p14:creationId xmlns:p14="http://schemas.microsoft.com/office/powerpoint/2010/main" val="3253852607"/>
+      </p:ext>
+    </p:extLst>
+  </p:cSld>
+  <p:clrMapOvr>
+    <a:masterClrMapping/>
+  </p:clrMapOvr>
+</p:sld>
+</file>
+
+<file path=ppt/slides/slide23.xml><?xml version="1.0" encoding="utf-8"?>
+<p:sld xmlns:a="http://schemas.openxmlformats.org/drawingml/2006/main" xmlns:r="http://schemas.openxmlformats.org/officeDocument/2006/relationships" xmlns:p="http://schemas.openxmlformats.org/presentationml/2006/main">
+  <p:cSld>
+    <p:spTree>
+      <p:nvGrpSpPr>
+        <p:cNvPr id="1" name=""/>
+        <p:cNvGrpSpPr/>
+        <p:nvPr/>
+      </p:nvGrpSpPr>
+      <p:grpSpPr>
+        <a:xfrm>
+          <a:off x="0" y="0"/>
+          <a:ext cx="0" cy="0"/>
+          <a:chOff x="0" y="0"/>
+          <a:chExt cx="0" cy="0"/>
+        </a:xfrm>
+      </p:grpSpPr>
+      <p:sp>
+        <p:nvSpPr>
+          <p:cNvPr id="2" name="Titel 1">
+            <a:extLst>
+              <a:ext uri="{FF2B5EF4-FFF2-40B4-BE49-F238E27FC236}">
+                <a16:creationId xmlns:a16="http://schemas.microsoft.com/office/drawing/2014/main" id="{7217218E-596B-404A-AF2E-9144752620BE}"/>
+              </a:ext>
+            </a:extLst>
+          </p:cNvPr>
+          <p:cNvSpPr>
+            <a:spLocks noGrp="1"/>
+          </p:cNvSpPr>
+          <p:nvPr>
+            <p:ph type="title"/>
+          </p:nvPr>
+        </p:nvSpPr>
+        <p:spPr/>
+        <p:txBody>
+          <a:bodyPr/>
+          <a:lstStyle/>
+          <a:p>
+            <a:r>
+              <a:rPr lang="de-DE" dirty="0"/>
+              <a:t>Demo</a:t>
+            </a:r>
+          </a:p>
+        </p:txBody>
+      </p:sp>
+      <p:sp>
+        <p:nvSpPr>
+          <p:cNvPr id="3" name="Textplatzhalter 2">
+            <a:extLst>
+              <a:ext uri="{FF2B5EF4-FFF2-40B4-BE49-F238E27FC236}">
+                <a16:creationId xmlns:a16="http://schemas.microsoft.com/office/drawing/2014/main" id="{43890C45-A149-4BCB-8AAB-65B3FB365FB9}"/>
+              </a:ext>
+            </a:extLst>
+          </p:cNvPr>
+          <p:cNvSpPr>
+            <a:spLocks noGrp="1"/>
+          </p:cNvSpPr>
+          <p:nvPr>
+            <p:ph type="body" idx="1"/>
+          </p:nvPr>
+        </p:nvSpPr>
+        <p:spPr/>
+        <p:txBody>
+          <a:bodyPr/>
+          <a:lstStyle/>
+          <a:p>
+            <a:r>
+              <a:rPr lang="de-DE" dirty="0" err="1"/>
+              <a:t>Using</a:t>
+            </a:r>
+            <a:r>
+              <a:rPr lang="de-DE" dirty="0"/>
+              <a:t> PACT Broker </a:t>
+            </a:r>
+            <a:r>
+              <a:rPr lang="de-DE" dirty="0" err="1"/>
+              <a:t>for</a:t>
+            </a:r>
+            <a:r>
+              <a:rPr lang="de-DE" dirty="0"/>
+              <a:t> </a:t>
+            </a:r>
+            <a:r>
+              <a:rPr lang="de-DE" dirty="0" err="1"/>
+              <a:t>file</a:t>
+            </a:r>
+            <a:r>
+              <a:rPr lang="de-DE" dirty="0"/>
+              <a:t> </a:t>
+            </a:r>
+            <a:r>
+              <a:rPr lang="de-DE" dirty="0" err="1"/>
+              <a:t>distribution</a:t>
+            </a:r>
+            <a:endParaRPr lang="de-DE" dirty="0"/>
+          </a:p>
+        </p:txBody>
+      </p:sp>
+    </p:spTree>
+    <p:extLst>
+      <p:ext uri="{BB962C8B-B14F-4D97-AF65-F5344CB8AC3E}">
+        <p14:creationId xmlns:p14="http://schemas.microsoft.com/office/powerpoint/2010/main" val="4141222110"/>
+      </p:ext>
+    </p:extLst>
+  </p:cSld>
+  <p:clrMapOvr>
+    <a:masterClrMapping/>
+  </p:clrMapOvr>
+</p:sld>
+</file>
+
+<file path=ppt/slides/slide24.xml><?xml version="1.0" encoding="utf-8"?>
+<p:sld xmlns:a="http://schemas.openxmlformats.org/drawingml/2006/main" xmlns:r="http://schemas.openxmlformats.org/officeDocument/2006/relationships" xmlns:p="http://schemas.openxmlformats.org/presentationml/2006/main">
+  <p:cSld>
+    <p:spTree>
+      <p:nvGrpSpPr>
+        <p:cNvPr id="1" name=""/>
+        <p:cNvGrpSpPr/>
+        <p:nvPr/>
+      </p:nvGrpSpPr>
+      <p:grpSpPr>
+        <a:xfrm>
+          <a:off x="0" y="0"/>
+          <a:ext cx="0" cy="0"/>
+          <a:chOff x="0" y="0"/>
+          <a:chExt cx="0" cy="0"/>
+        </a:xfrm>
+      </p:grpSpPr>
+      <p:sp>
+        <p:nvSpPr>
+          <p:cNvPr id="2" name="Titel 1">
+            <a:extLst>
+              <a:ext uri="{FF2B5EF4-FFF2-40B4-BE49-F238E27FC236}">
+                <a16:creationId xmlns:a16="http://schemas.microsoft.com/office/drawing/2014/main" id="{72A2239D-1B50-4659-917C-D90E07573D89}"/>
+              </a:ext>
+            </a:extLst>
+          </p:cNvPr>
+          <p:cNvSpPr>
+            <a:spLocks noGrp="1"/>
+          </p:cNvSpPr>
+          <p:nvPr>
+            <p:ph type="title"/>
+          </p:nvPr>
+        </p:nvSpPr>
+        <p:spPr/>
+        <p:txBody>
+          <a:bodyPr/>
+          <a:lstStyle/>
+          <a:p>
+            <a:r>
+              <a:rPr lang="de-DE" dirty="0" err="1"/>
+              <a:t>Conclusion</a:t>
+            </a:r>
+            <a:endParaRPr lang="de-DE" dirty="0"/>
+          </a:p>
+        </p:txBody>
+      </p:sp>
+      <p:sp>
+        <p:nvSpPr>
+          <p:cNvPr id="3" name="Textplatzhalter 2">
+            <a:extLst>
+              <a:ext uri="{FF2B5EF4-FFF2-40B4-BE49-F238E27FC236}">
+                <a16:creationId xmlns:a16="http://schemas.microsoft.com/office/drawing/2014/main" id="{8B85CAB6-2148-483A-BD37-F82BF8E9F744}"/>
+              </a:ext>
+            </a:extLst>
+          </p:cNvPr>
+          <p:cNvSpPr>
+            <a:spLocks noGrp="1"/>
+          </p:cNvSpPr>
+          <p:nvPr>
+            <p:ph type="body" idx="1"/>
+          </p:nvPr>
+        </p:nvSpPr>
+        <p:spPr/>
+        <p:txBody>
+          <a:bodyPr/>
+          <a:lstStyle/>
+          <a:p>
+            <a:r>
+              <a:rPr lang="de-DE" dirty="0" err="1"/>
+              <a:t>Does</a:t>
+            </a:r>
+            <a:r>
+              <a:rPr lang="de-DE" dirty="0"/>
+              <a:t> </a:t>
+            </a:r>
+            <a:r>
+              <a:rPr lang="de-DE" dirty="0" err="1"/>
+              <a:t>it</a:t>
+            </a:r>
+            <a:r>
+              <a:rPr lang="de-DE" dirty="0"/>
+              <a:t> </a:t>
+            </a:r>
+            <a:r>
+              <a:rPr lang="de-DE" dirty="0" err="1"/>
+              <a:t>help</a:t>
+            </a:r>
+            <a:r>
+              <a:rPr lang="de-DE" dirty="0"/>
+              <a:t> </a:t>
+            </a:r>
+            <a:r>
+              <a:rPr lang="de-DE" dirty="0" err="1"/>
+              <a:t>to</a:t>
+            </a:r>
+            <a:r>
+              <a:rPr lang="de-DE" dirty="0"/>
+              <a:t> </a:t>
+            </a:r>
+            <a:r>
+              <a:rPr lang="de-DE" dirty="0" err="1"/>
+              <a:t>improve</a:t>
+            </a:r>
+            <a:r>
+              <a:rPr lang="de-DE" dirty="0"/>
+              <a:t> </a:t>
+            </a:r>
+            <a:r>
+              <a:rPr lang="de-DE" dirty="0" err="1"/>
+              <a:t>my</a:t>
+            </a:r>
+            <a:r>
+              <a:rPr lang="de-DE" dirty="0"/>
+              <a:t> </a:t>
+            </a:r>
+            <a:r>
+              <a:rPr lang="de-DE" dirty="0" err="1"/>
+              <a:t>quality</a:t>
+            </a:r>
+            <a:r>
+              <a:rPr lang="de-DE" dirty="0"/>
+              <a:t>?</a:t>
+            </a:r>
+          </a:p>
+        </p:txBody>
+      </p:sp>
+    </p:spTree>
+    <p:extLst>
+      <p:ext uri="{BB962C8B-B14F-4D97-AF65-F5344CB8AC3E}">
+        <p14:creationId xmlns:p14="http://schemas.microsoft.com/office/powerpoint/2010/main" val="2425680740"/>
+      </p:ext>
+    </p:extLst>
+  </p:cSld>
+  <p:clrMapOvr>
+    <a:masterClrMapping/>
+  </p:clrMapOvr>
+</p:sld>
+</file>
+
+<file path=ppt/slides/slide25.xml><?xml version="1.0" encoding="utf-8"?>
+<p:sld xmlns:a="http://schemas.openxmlformats.org/drawingml/2006/main" xmlns:r="http://schemas.openxmlformats.org/officeDocument/2006/relationships" xmlns:p="http://schemas.openxmlformats.org/presentationml/2006/main">
+  <p:cSld>
+    <p:spTree>
+      <p:nvGrpSpPr>
+        <p:cNvPr id="1" name=""/>
+        <p:cNvGrpSpPr/>
+        <p:nvPr/>
+      </p:nvGrpSpPr>
+      <p:grpSpPr>
+        <a:xfrm>
+          <a:off x="0" y="0"/>
+          <a:ext cx="0" cy="0"/>
+          <a:chOff x="0" y="0"/>
+          <a:chExt cx="0" cy="0"/>
+        </a:xfrm>
+      </p:grpSpPr>
+      <p:sp>
+        <p:nvSpPr>
+          <p:cNvPr id="4" name="Titel 3">
+            <a:extLst>
+              <a:ext uri="{FF2B5EF4-FFF2-40B4-BE49-F238E27FC236}">
+                <a16:creationId xmlns:a16="http://schemas.microsoft.com/office/drawing/2014/main" id="{A2B87DC5-8A1B-4DC7-BF1E-36044ECDDFFE}"/>
+              </a:ext>
+            </a:extLst>
+          </p:cNvPr>
+          <p:cNvSpPr>
+            <a:spLocks noGrp="1"/>
+          </p:cNvSpPr>
+          <p:nvPr>
+            <p:ph type="title"/>
+          </p:nvPr>
+        </p:nvSpPr>
+        <p:spPr>
+          <a:xfrm>
+            <a:off x="838200" y="2766218"/>
+            <a:ext cx="10515600" cy="1325563"/>
+          </a:xfrm>
+        </p:spPr>
+        <p:txBody>
+          <a:bodyPr>
+            <a:normAutofit/>
+          </a:bodyPr>
+          <a:lstStyle/>
+          <a:p>
+            <a:pPr algn="ctr"/>
+            <a:r>
+              <a:rPr lang="de-DE" sz="8000" b="1" dirty="0"/>
+              <a:t>!! YES !!</a:t>
+            </a:r>
+          </a:p>
+        </p:txBody>
+      </p:sp>
+    </p:spTree>
+    <p:extLst>
+      <p:ext uri="{BB962C8B-B14F-4D97-AF65-F5344CB8AC3E}">
+        <p14:creationId xmlns:p14="http://schemas.microsoft.com/office/powerpoint/2010/main" val="1829565490"/>
+      </p:ext>
+    </p:extLst>
+  </p:cSld>
+  <p:clrMapOvr>
+    <a:masterClrMapping/>
+  </p:clrMapOvr>
+</p:sld>
+</file>
+
+<file path=ppt/slides/slide26.xml><?xml version="1.0" encoding="utf-8"?>
+<p:sld xmlns:a="http://schemas.openxmlformats.org/drawingml/2006/main" xmlns:r="http://schemas.openxmlformats.org/officeDocument/2006/relationships" xmlns:p="http://schemas.openxmlformats.org/presentationml/2006/main">
+  <p:cSld>
+    <p:spTree>
+      <p:nvGrpSpPr>
+        <p:cNvPr id="1" name=""/>
+        <p:cNvGrpSpPr/>
+        <p:nvPr/>
+      </p:nvGrpSpPr>
+      <p:grpSpPr>
+        <a:xfrm>
+          <a:off x="0" y="0"/>
+          <a:ext cx="0" cy="0"/>
+          <a:chOff x="0" y="0"/>
+          <a:chExt cx="0" cy="0"/>
+        </a:xfrm>
+      </p:grpSpPr>
+      <p:sp>
+        <p:nvSpPr>
+          <p:cNvPr id="4" name="Titel 3">
+            <a:extLst>
+              <a:ext uri="{FF2B5EF4-FFF2-40B4-BE49-F238E27FC236}">
+                <a16:creationId xmlns:a16="http://schemas.microsoft.com/office/drawing/2014/main" id="{A51D4595-3407-41AF-B17A-84CCDEDD0B98}"/>
+              </a:ext>
+            </a:extLst>
+          </p:cNvPr>
+          <p:cNvSpPr>
+            <a:spLocks noGrp="1"/>
+          </p:cNvSpPr>
+          <p:nvPr>
+            <p:ph type="title"/>
+          </p:nvPr>
+        </p:nvSpPr>
+        <p:spPr/>
+        <p:txBody>
+          <a:bodyPr/>
+          <a:lstStyle/>
+          <a:p>
+            <a:r>
+              <a:rPr lang="de-DE" dirty="0" err="1"/>
+              <a:t>Recommendations</a:t>
+            </a:r>
+            <a:endParaRPr lang="de-DE" dirty="0"/>
+          </a:p>
+        </p:txBody>
+      </p:sp>
+      <p:sp>
+        <p:nvSpPr>
+          <p:cNvPr id="5" name="Inhaltsplatzhalter 4">
+            <a:extLst>
+              <a:ext uri="{FF2B5EF4-FFF2-40B4-BE49-F238E27FC236}">
+                <a16:creationId xmlns:a16="http://schemas.microsoft.com/office/drawing/2014/main" id="{013D9DDF-CEAC-4662-B6DF-EDC9AD487195}"/>
+              </a:ext>
+            </a:extLst>
+          </p:cNvPr>
+          <p:cNvSpPr>
+            <a:spLocks noGrp="1"/>
+          </p:cNvSpPr>
+          <p:nvPr>
+            <p:ph idx="1"/>
+          </p:nvPr>
+        </p:nvSpPr>
+        <p:spPr/>
+        <p:txBody>
+          <a:bodyPr/>
+          <a:lstStyle/>
+          <a:p>
+            <a:endParaRPr lang="de-DE"/>
+          </a:p>
+        </p:txBody>
+      </p:sp>
+    </p:spTree>
+    <p:extLst>
+      <p:ext uri="{BB962C8B-B14F-4D97-AF65-F5344CB8AC3E}">
+        <p14:creationId xmlns:p14="http://schemas.microsoft.com/office/powerpoint/2010/main" val="3581365617"/>
       </p:ext>
     </p:extLst>
   </p:cSld>

</xml_diff>